<commit_message>
updates to presentation 2
</commit_message>
<xml_diff>
--- a/Presentations/Step2Presentation_ECON5305_DataTranslationChallenge.pptx
+++ b/Presentations/Step2Presentation_ECON5305_DataTranslationChallenge.pptx
@@ -217,7 +217,7 @@
           <a:p>
             <a:fld id="{D70FD15B-C581-9A4E-994A-4EB5503338F2}" type="datetimeFigureOut">
               <a:rPr lang="en-US" smtClean="0"/>
-              <a:t>5/29/2024</a:t>
+              <a:t>5/29/24</a:t>
             </a:fld>
             <a:endParaRPr lang="en-US"/>
           </a:p>
@@ -715,7 +715,7 @@
           <a:p>
             <a:fld id="{713D5187-C304-E74E-99D9-422FCE62D683}" type="datetimeFigureOut">
               <a:rPr lang="en-US" smtClean="0"/>
-              <a:t>5/29/2024</a:t>
+              <a:t>5/29/24</a:t>
             </a:fld>
             <a:endParaRPr lang="en-US"/>
           </a:p>
@@ -913,7 +913,7 @@
           <a:p>
             <a:fld id="{713D5187-C304-E74E-99D9-422FCE62D683}" type="datetimeFigureOut">
               <a:rPr lang="en-US" smtClean="0"/>
-              <a:t>5/29/2024</a:t>
+              <a:t>5/29/24</a:t>
             </a:fld>
             <a:endParaRPr lang="en-US"/>
           </a:p>
@@ -1121,7 +1121,7 @@
           <a:p>
             <a:fld id="{713D5187-C304-E74E-99D9-422FCE62D683}" type="datetimeFigureOut">
               <a:rPr lang="en-US" smtClean="0"/>
-              <a:t>5/29/2024</a:t>
+              <a:t>5/29/24</a:t>
             </a:fld>
             <a:endParaRPr lang="en-US"/>
           </a:p>
@@ -1319,7 +1319,7 @@
           <a:p>
             <a:fld id="{713D5187-C304-E74E-99D9-422FCE62D683}" type="datetimeFigureOut">
               <a:rPr lang="en-US" smtClean="0"/>
-              <a:t>5/29/2024</a:t>
+              <a:t>5/29/24</a:t>
             </a:fld>
             <a:endParaRPr lang="en-US"/>
           </a:p>
@@ -1594,7 +1594,7 @@
           <a:p>
             <a:fld id="{713D5187-C304-E74E-99D9-422FCE62D683}" type="datetimeFigureOut">
               <a:rPr lang="en-US" smtClean="0"/>
-              <a:t>5/29/2024</a:t>
+              <a:t>5/29/24</a:t>
             </a:fld>
             <a:endParaRPr lang="en-US"/>
           </a:p>
@@ -1859,7 +1859,7 @@
           <a:p>
             <a:fld id="{713D5187-C304-E74E-99D9-422FCE62D683}" type="datetimeFigureOut">
               <a:rPr lang="en-US" smtClean="0"/>
-              <a:t>5/29/2024</a:t>
+              <a:t>5/29/24</a:t>
             </a:fld>
             <a:endParaRPr lang="en-US"/>
           </a:p>
@@ -2271,7 +2271,7 @@
           <a:p>
             <a:fld id="{713D5187-C304-E74E-99D9-422FCE62D683}" type="datetimeFigureOut">
               <a:rPr lang="en-US" smtClean="0"/>
-              <a:t>5/29/2024</a:t>
+              <a:t>5/29/24</a:t>
             </a:fld>
             <a:endParaRPr lang="en-US"/>
           </a:p>
@@ -2412,7 +2412,7 @@
           <a:p>
             <a:fld id="{713D5187-C304-E74E-99D9-422FCE62D683}" type="datetimeFigureOut">
               <a:rPr lang="en-US" smtClean="0"/>
-              <a:t>5/29/2024</a:t>
+              <a:t>5/29/24</a:t>
             </a:fld>
             <a:endParaRPr lang="en-US"/>
           </a:p>
@@ -2525,7 +2525,7 @@
           <a:p>
             <a:fld id="{713D5187-C304-E74E-99D9-422FCE62D683}" type="datetimeFigureOut">
               <a:rPr lang="en-US" smtClean="0"/>
-              <a:t>5/29/2024</a:t>
+              <a:t>5/29/24</a:t>
             </a:fld>
             <a:endParaRPr lang="en-US"/>
           </a:p>
@@ -2836,7 +2836,7 @@
           <a:p>
             <a:fld id="{713D5187-C304-E74E-99D9-422FCE62D683}" type="datetimeFigureOut">
               <a:rPr lang="en-US" smtClean="0"/>
-              <a:t>5/29/2024</a:t>
+              <a:t>5/29/24</a:t>
             </a:fld>
             <a:endParaRPr lang="en-US"/>
           </a:p>
@@ -3124,7 +3124,7 @@
           <a:p>
             <a:fld id="{713D5187-C304-E74E-99D9-422FCE62D683}" type="datetimeFigureOut">
               <a:rPr lang="en-US" smtClean="0"/>
-              <a:t>5/29/2024</a:t>
+              <a:t>5/29/24</a:t>
             </a:fld>
             <a:endParaRPr lang="en-US"/>
           </a:p>
@@ -3365,7 +3365,7 @@
           <a:p>
             <a:fld id="{713D5187-C304-E74E-99D9-422FCE62D683}" type="datetimeFigureOut">
               <a:rPr lang="en-US" smtClean="0"/>
-              <a:t>5/29/2024</a:t>
+              <a:t>5/29/24</a:t>
             </a:fld>
             <a:endParaRPr lang="en-US"/>
           </a:p>
@@ -4956,7 +4956,7 @@
               <a:rPr lang="en-US" sz="2000" dirty="0">
                 <a:latin typeface="Fira Sans" panose="020B0503050000020004" pitchFamily="34" charset="0"/>
               </a:rPr>
-              <a:t>Monthly Data</a:t>
+              <a:t>Quarterly Data</a:t>
             </a:r>
           </a:p>
           <a:p>
@@ -5238,14 +5238,14 @@
           <p:nvPr>
             <p:extLst>
               <p:ext uri="{D42A27DB-BD31-4B8C-83A1-F6EECF244321}">
-                <p14:modId xmlns:p14="http://schemas.microsoft.com/office/powerpoint/2010/main" val="3107014533"/>
+                <p14:modId xmlns:p14="http://schemas.microsoft.com/office/powerpoint/2010/main" val="396939442"/>
               </p:ext>
             </p:extLst>
           </p:nvPr>
         </p:nvGraphicFramePr>
         <p:xfrm>
           <a:off x="1941324" y="2572702"/>
-          <a:ext cx="8309352" cy="1828800"/>
+          <a:ext cx="8309352" cy="1706880"/>
         </p:xfrm>
         <a:graphic>
           <a:graphicData uri="http://schemas.openxmlformats.org/drawingml/2006/table">
@@ -5289,7 +5289,7 @@
                     <a:p>
                       <a:pPr algn="ctr"/>
                       <a:r>
-                        <a:rPr lang="en-US" sz="2400" b="1" dirty="0">
+                        <a:rPr lang="en-US" sz="2200" b="1" dirty="0">
                           <a:solidFill>
                             <a:schemeClr val="bg1"/>
                           </a:solidFill>
@@ -5349,7 +5349,7 @@
                     <a:p>
                       <a:pPr algn="ctr"/>
                       <a:r>
-                        <a:rPr lang="en-US" sz="2400" b="1" dirty="0">
+                        <a:rPr lang="en-US" sz="2200" b="1" dirty="0">
                           <a:solidFill>
                             <a:schemeClr val="bg1"/>
                           </a:solidFill>
@@ -5409,7 +5409,7 @@
                     <a:p>
                       <a:pPr algn="ctr"/>
                       <a:r>
-                        <a:rPr lang="en-US" sz="2400" b="1" dirty="0">
+                        <a:rPr lang="en-US" sz="2200" b="1" dirty="0">
                           <a:solidFill>
                             <a:schemeClr val="bg1"/>
                           </a:solidFill>
@@ -5469,7 +5469,7 @@
                     <a:p>
                       <a:pPr algn="ctr"/>
                       <a:r>
-                        <a:rPr lang="en-US" sz="2400" b="1" dirty="0">
+                        <a:rPr lang="en-US" sz="2200" b="1" dirty="0">
                           <a:solidFill>
                             <a:schemeClr val="bg1"/>
                           </a:solidFill>
@@ -5536,7 +5536,7 @@
                     <a:p>
                       <a:pPr algn="l"/>
                       <a:r>
-                        <a:rPr lang="en-US" sz="2400" dirty="0">
+                        <a:rPr lang="en-US" sz="2200" dirty="0">
                           <a:solidFill>
                             <a:schemeClr val="tx1"/>
                           </a:solidFill>
@@ -5599,7 +5599,7 @@
                     <a:p>
                       <a:pPr algn="r"/>
                       <a:r>
-                        <a:rPr lang="en-US" sz="2400" dirty="0">
+                        <a:rPr lang="en-US" sz="2200" dirty="0">
                           <a:solidFill>
                             <a:schemeClr val="tx1"/>
                           </a:solidFill>
@@ -5662,7 +5662,7 @@
                     <a:p>
                       <a:pPr algn="r"/>
                       <a:r>
-                        <a:rPr lang="en-US" sz="2400" dirty="0">
+                        <a:rPr lang="en-US" sz="2200" dirty="0">
                           <a:solidFill>
                             <a:schemeClr val="tx1"/>
                           </a:solidFill>
@@ -5725,7 +5725,7 @@
                     <a:p>
                       <a:pPr algn="r"/>
                       <a:r>
-                        <a:rPr lang="en-US" sz="2400" dirty="0">
+                        <a:rPr lang="en-US" sz="2200" dirty="0">
                           <a:solidFill>
                             <a:schemeClr val="tx1"/>
                           </a:solidFill>
@@ -5795,7 +5795,7 @@
                     <a:p>
                       <a:pPr algn="l"/>
                       <a:r>
-                        <a:rPr lang="en-US" sz="2400" dirty="0">
+                        <a:rPr lang="en-US" sz="2200" dirty="0">
                           <a:solidFill>
                             <a:schemeClr val="tx1"/>
                           </a:solidFill>
@@ -5858,7 +5858,7 @@
                     <a:p>
                       <a:pPr algn="r"/>
                       <a:r>
-                        <a:rPr lang="en-US" sz="2400" dirty="0">
+                        <a:rPr lang="en-US" sz="2200" dirty="0">
                           <a:solidFill>
                             <a:schemeClr val="tx1"/>
                           </a:solidFill>
@@ -5921,7 +5921,7 @@
                     <a:p>
                       <a:pPr algn="r"/>
                       <a:r>
-                        <a:rPr lang="en-US" sz="2400" dirty="0">
+                        <a:rPr lang="en-US" sz="2200" dirty="0">
                           <a:solidFill>
                             <a:schemeClr val="tx1"/>
                           </a:solidFill>
@@ -5984,7 +5984,7 @@
                     <a:p>
                       <a:pPr algn="r"/>
                       <a:r>
-                        <a:rPr lang="en-US" sz="2400" dirty="0">
+                        <a:rPr lang="en-US" sz="2200" dirty="0">
                           <a:solidFill>
                             <a:schemeClr val="tx1"/>
                           </a:solidFill>
@@ -6054,7 +6054,7 @@
                     <a:p>
                       <a:pPr algn="l"/>
                       <a:r>
-                        <a:rPr lang="en-US" sz="2400" dirty="0">
+                        <a:rPr lang="en-US" sz="2200" dirty="0">
                           <a:solidFill>
                             <a:schemeClr val="tx1"/>
                           </a:solidFill>
@@ -6117,7 +6117,7 @@
                     <a:p>
                       <a:pPr algn="r"/>
                       <a:r>
-                        <a:rPr lang="en-US" sz="2400" dirty="0">
+                        <a:rPr lang="en-US" sz="2200" dirty="0">
                           <a:solidFill>
                             <a:schemeClr val="tx1"/>
                           </a:solidFill>
@@ -6180,7 +6180,7 @@
                     <a:p>
                       <a:pPr algn="r"/>
                       <a:r>
-                        <a:rPr lang="en-US" sz="2400" dirty="0">
+                        <a:rPr lang="en-US" sz="2200" dirty="0">
                           <a:solidFill>
                             <a:schemeClr val="tx1"/>
                           </a:solidFill>
@@ -6243,7 +6243,7 @@
                     <a:p>
                       <a:pPr algn="r"/>
                       <a:r>
-                        <a:rPr lang="en-US" sz="2400" dirty="0">
+                        <a:rPr lang="en-US" sz="2200" dirty="0">
                           <a:solidFill>
                             <a:schemeClr val="tx1"/>
                           </a:solidFill>
@@ -6532,13 +6532,13 @@
           <p:nvPr>
             <p:extLst>
               <p:ext uri="{D42A27DB-BD31-4B8C-83A1-F6EECF244321}">
-                <p14:modId xmlns:p14="http://schemas.microsoft.com/office/powerpoint/2010/main" val="248429502"/>
+                <p14:modId xmlns:p14="http://schemas.microsoft.com/office/powerpoint/2010/main" val="3719144724"/>
               </p:ext>
             </p:extLst>
           </p:nvPr>
         </p:nvGraphicFramePr>
         <p:xfrm>
-          <a:off x="2027568" y="1383580"/>
+          <a:off x="1107251" y="1841317"/>
           <a:ext cx="9977498" cy="4023360"/>
         </p:xfrm>
         <a:graphic>
@@ -7031,7 +7031,7 @@
                     <a:p>
                       <a:pPr algn="l"/>
                       <a:r>
-                        <a:rPr lang="en-US" sz="1600" dirty="0">
+                        <a:rPr lang="en-US" sz="1600" b="0" dirty="0">
                           <a:solidFill>
                             <a:schemeClr val="tx1"/>
                           </a:solidFill>
@@ -7094,7 +7094,7 @@
                     <a:p>
                       <a:pPr marL="0" algn="l" defTabSz="914400" rtl="0" eaLnBrk="1" latinLnBrk="0" hangingPunct="1"/>
                       <a:r>
-                        <a:rPr lang="en-US" sz="1600" dirty="0">
+                        <a:rPr lang="en-US" sz="1600" b="0" dirty="0">
                           <a:solidFill>
                             <a:schemeClr val="tx1"/>
                           </a:solidFill>
@@ -7406,7 +7406,7 @@
                     <a:p>
                       <a:pPr algn="r"/>
                       <a:r>
-                        <a:rPr lang="en-US" sz="1600" dirty="0">
+                        <a:rPr lang="en-US" sz="1600" b="0" dirty="0">
                           <a:solidFill>
                             <a:schemeClr val="tx1"/>
                           </a:solidFill>
@@ -7492,7 +7492,7 @@
                         <a:defRPr/>
                       </a:pPr>
                       <a:r>
-                        <a:rPr lang="en-US" sz="1600" dirty="0">
+                        <a:rPr lang="en-US" sz="1600" b="0" dirty="0">
                           <a:solidFill>
                             <a:schemeClr val="tx1"/>
                           </a:solidFill>
@@ -7541,10 +7541,7 @@
                       <a:tailEnd type="none" w="med" len="med"/>
                     </a:lnB>
                     <a:solidFill>
-                      <a:schemeClr val="accent1">
-                        <a:lumMod val="20000"/>
-                        <a:lumOff val="80000"/>
-                      </a:schemeClr>
+                      <a:srgbClr val="B6D8E8"/>
                     </a:solidFill>
                   </a:tcPr>
                 </a:tc>
@@ -7555,7 +7552,7 @@
                     <a:p>
                       <a:pPr marL="0" algn="l" defTabSz="914400" rtl="0" eaLnBrk="1" latinLnBrk="0" hangingPunct="1"/>
                       <a:r>
-                        <a:rPr lang="en-US" sz="1600" dirty="0">
+                        <a:rPr lang="en-US" sz="1600" b="0" dirty="0">
                           <a:solidFill>
                             <a:schemeClr val="tx1"/>
                           </a:solidFill>
@@ -7564,7 +7561,7 @@
                         </a:rPr>
                         <a:t>Fixed</a:t>
                       </a:r>
-                      <a:endParaRPr lang="en-US" sz="1600" dirty="0">
+                      <a:endParaRPr lang="en-US" sz="1600" b="0" dirty="0">
                         <a:solidFill>
                           <a:schemeClr val="tx1"/>
                         </a:solidFill>
@@ -7611,10 +7608,7 @@
                       <a:tailEnd type="none" w="med" len="med"/>
                     </a:lnB>
                     <a:solidFill>
-                      <a:schemeClr val="accent1">
-                        <a:lumMod val="20000"/>
-                        <a:lumOff val="80000"/>
-                      </a:schemeClr>
+                      <a:srgbClr val="B6D8E8"/>
                     </a:solidFill>
                   </a:tcPr>
                 </a:tc>
@@ -7674,10 +7668,7 @@
                       <a:tailEnd type="none" w="med" len="med"/>
                     </a:lnB>
                     <a:solidFill>
-                      <a:schemeClr val="accent1">
-                        <a:lumMod val="20000"/>
-                        <a:lumOff val="80000"/>
-                      </a:schemeClr>
+                      <a:srgbClr val="B6D8E8"/>
                     </a:solidFill>
                   </a:tcPr>
                 </a:tc>
@@ -7737,10 +7728,7 @@
                       <a:tailEnd type="none" w="med" len="med"/>
                     </a:lnB>
                     <a:solidFill>
-                      <a:schemeClr val="accent1">
-                        <a:lumMod val="20000"/>
-                        <a:lumOff val="80000"/>
-                      </a:schemeClr>
+                      <a:srgbClr val="B6D8E8"/>
                     </a:solidFill>
                   </a:tcPr>
                 </a:tc>
@@ -7760,7 +7748,7 @@
                         </a:rPr>
                         <a:t>23.6300</a:t>
                       </a:r>
-                      <a:endParaRPr lang="en-US" b="0"/>
+                      <a:endParaRPr lang="en-US" b="0" dirty="0"/>
                     </a:p>
                   </a:txBody>
                   <a:tcPr anchor="ctr">
@@ -7801,10 +7789,7 @@
                       <a:tailEnd type="none" w="med" len="med"/>
                     </a:lnB>
                     <a:solidFill>
-                      <a:schemeClr val="accent1">
-                        <a:lumMod val="20000"/>
-                        <a:lumOff val="80000"/>
-                      </a:schemeClr>
+                      <a:srgbClr val="B6D8E8"/>
                     </a:solidFill>
                   </a:tcPr>
                 </a:tc>
@@ -7864,10 +7849,7 @@
                       <a:tailEnd type="none" w="med" len="med"/>
                     </a:lnB>
                     <a:solidFill>
-                      <a:schemeClr val="accent1">
-                        <a:lumMod val="20000"/>
-                        <a:lumOff val="80000"/>
-                      </a:schemeClr>
+                      <a:srgbClr val="B6D8E8"/>
                     </a:solidFill>
                   </a:tcPr>
                 </a:tc>
@@ -7927,10 +7909,7 @@
                       <a:tailEnd type="none" w="med" len="med"/>
                     </a:lnB>
                     <a:solidFill>
-                      <a:schemeClr val="accent1">
-                        <a:lumMod val="20000"/>
-                        <a:lumOff val="80000"/>
-                      </a:schemeClr>
+                      <a:srgbClr val="B6D8E8"/>
                     </a:solidFill>
                   </a:tcPr>
                 </a:tc>
@@ -8451,10 +8430,7 @@
                       <a:tailEnd type="none" w="med" len="med"/>
                     </a:lnB>
                     <a:solidFill>
-                      <a:schemeClr val="accent1">
-                        <a:lumMod val="20000"/>
-                        <a:lumOff val="80000"/>
-                      </a:schemeClr>
+                      <a:srgbClr val="B6D8E8"/>
                     </a:solidFill>
                   </a:tcPr>
                 </a:tc>
@@ -8465,7 +8441,7 @@
                     <a:p>
                       <a:pPr marL="0" algn="l" defTabSz="914400" rtl="0" eaLnBrk="1" latinLnBrk="0" hangingPunct="1"/>
                       <a:r>
-                        <a:rPr lang="en-US" sz="1600" dirty="0">
+                        <a:rPr lang="en-US" sz="1600" b="0" dirty="0">
                           <a:solidFill>
                             <a:schemeClr val="tx1"/>
                           </a:solidFill>
@@ -8514,10 +8490,7 @@
                       <a:tailEnd type="none" w="med" len="med"/>
                     </a:lnB>
                     <a:solidFill>
-                      <a:schemeClr val="accent1">
-                        <a:lumMod val="20000"/>
-                        <a:lumOff val="80000"/>
-                      </a:schemeClr>
+                      <a:srgbClr val="B6D8E8"/>
                     </a:solidFill>
                   </a:tcPr>
                 </a:tc>
@@ -8577,10 +8550,7 @@
                       <a:tailEnd type="none" w="med" len="med"/>
                     </a:lnB>
                     <a:solidFill>
-                      <a:schemeClr val="accent1">
-                        <a:lumMod val="20000"/>
-                        <a:lumOff val="80000"/>
-                      </a:schemeClr>
+                      <a:srgbClr val="B6D8E8"/>
                     </a:solidFill>
                   </a:tcPr>
                 </a:tc>
@@ -8640,10 +8610,7 @@
                       <a:tailEnd type="none" w="med" len="med"/>
                     </a:lnB>
                     <a:solidFill>
-                      <a:schemeClr val="accent1">
-                        <a:lumMod val="20000"/>
-                        <a:lumOff val="80000"/>
-                      </a:schemeClr>
+                      <a:srgbClr val="B6D8E8"/>
                     </a:solidFill>
                   </a:tcPr>
                 </a:tc>
@@ -8703,10 +8670,7 @@
                       <a:tailEnd type="none" w="med" len="med"/>
                     </a:lnB>
                     <a:solidFill>
-                      <a:schemeClr val="accent1">
-                        <a:lumMod val="20000"/>
-                        <a:lumOff val="80000"/>
-                      </a:schemeClr>
+                      <a:srgbClr val="B6D8E8"/>
                     </a:solidFill>
                   </a:tcPr>
                 </a:tc>
@@ -8725,7 +8689,7 @@
                         </a:rPr>
                         <a:t>3.5896</a:t>
                       </a:r>
-                      <a:endParaRPr lang="en-US" sz="1600" b="0">
+                      <a:endParaRPr lang="en-US" sz="1600" b="0" dirty="0">
                         <a:latin typeface="Fira Sans"/>
                       </a:endParaRPr>
                     </a:p>
@@ -8752,10 +8716,7 @@
                       </a:solidFill>
                     </a:lnB>
                     <a:solidFill>
-                      <a:schemeClr val="accent1">
-                        <a:lumMod val="20000"/>
-                        <a:lumOff val="80000"/>
-                      </a:schemeClr>
+                      <a:srgbClr val="B6D8E8"/>
                     </a:solidFill>
                   </a:tcPr>
                 </a:tc>
@@ -8815,10 +8776,7 @@
                       <a:tailEnd type="none" w="med" len="med"/>
                     </a:lnB>
                     <a:solidFill>
-                      <a:schemeClr val="accent1">
-                        <a:lumMod val="20000"/>
-                        <a:lumOff val="80000"/>
-                      </a:schemeClr>
+                      <a:srgbClr val="B6D8E8"/>
                     </a:solidFill>
                   </a:tcPr>
                 </a:tc>
@@ -8909,7 +8867,7 @@
                     <a:p>
                       <a:pPr marL="0" algn="l" defTabSz="914400" rtl="0" eaLnBrk="1" latinLnBrk="0" hangingPunct="1"/>
                       <a:r>
-                        <a:rPr lang="en-US" sz="1600" dirty="0">
+                        <a:rPr lang="en-US" sz="1600" b="0" dirty="0">
                           <a:solidFill>
                             <a:schemeClr val="tx1"/>
                           </a:solidFill>
@@ -9290,7 +9248,7 @@
                         </a:spcAft>
                       </a:pPr>
                       <a:r>
-                        <a:rPr lang="en-US" sz="1600" b="1" i="0" u="none" strike="noStrike" dirty="0">
+                        <a:rPr lang="en-US" sz="1600" b="0" i="0" u="none" strike="noStrike" dirty="0">
                           <a:solidFill>
                             <a:srgbClr val="000000"/>
                           </a:solidFill>
@@ -9339,10 +9297,7 @@
                       <a:tailEnd type="none" w="med" len="med"/>
                     </a:lnB>
                     <a:solidFill>
-                      <a:schemeClr val="accent1">
-                        <a:lumMod val="20000"/>
-                        <a:lumOff val="80000"/>
-                      </a:schemeClr>
+                      <a:srgbClr val="B6D8E8"/>
                     </a:solidFill>
                   </a:tcPr>
                 </a:tc>
@@ -9353,7 +9308,7 @@
                     <a:p>
                       <a:pPr marL="0" algn="l" defTabSz="914400" rtl="0" eaLnBrk="1" latinLnBrk="0" hangingPunct="1"/>
                       <a:r>
-                        <a:rPr lang="en-US" sz="1600" b="1" dirty="0">
+                        <a:rPr lang="en-US" sz="1600" b="0" dirty="0">
                           <a:solidFill>
                             <a:schemeClr val="tx1"/>
                           </a:solidFill>
@@ -9402,10 +9357,7 @@
                       <a:tailEnd type="none" w="med" len="med"/>
                     </a:lnB>
                     <a:solidFill>
-                      <a:schemeClr val="accent1">
-                        <a:lumMod val="20000"/>
-                        <a:lumOff val="80000"/>
-                      </a:schemeClr>
+                      <a:srgbClr val="B6D8E8"/>
                     </a:solidFill>
                   </a:tcPr>
                 </a:tc>
@@ -9416,7 +9368,7 @@
                     <a:p>
                       <a:pPr algn="r" fontAlgn="b"/>
                       <a:r>
-                        <a:rPr lang="en-US" sz="1600" b="1" i="0" u="none" strike="noStrike" dirty="0">
+                        <a:rPr lang="en-US" sz="1600" b="0" i="0" u="none" strike="noStrike" dirty="0">
                           <a:solidFill>
                             <a:srgbClr val="000000"/>
                           </a:solidFill>
@@ -9465,10 +9417,7 @@
                       <a:tailEnd type="none" w="med" len="med"/>
                     </a:lnB>
                     <a:solidFill>
-                      <a:schemeClr val="accent1">
-                        <a:lumMod val="20000"/>
-                        <a:lumOff val="80000"/>
-                      </a:schemeClr>
+                      <a:srgbClr val="B6D8E8"/>
                     </a:solidFill>
                   </a:tcPr>
                 </a:tc>
@@ -9479,7 +9428,7 @@
                     <a:p>
                       <a:pPr algn="r" fontAlgn="b"/>
                       <a:r>
-                        <a:rPr lang="en-US" sz="1600" b="1" i="0" u="none" strike="noStrike" dirty="0">
+                        <a:rPr lang="en-US" sz="1600" b="0" i="0" u="none" strike="noStrike" dirty="0">
                           <a:solidFill>
                             <a:srgbClr val="000000"/>
                           </a:solidFill>
@@ -9528,10 +9477,7 @@
                       <a:tailEnd type="none" w="med" len="med"/>
                     </a:lnB>
                     <a:solidFill>
-                      <a:schemeClr val="accent1">
-                        <a:lumMod val="20000"/>
-                        <a:lumOff val="80000"/>
-                      </a:schemeClr>
+                      <a:srgbClr val="B6D8E8"/>
                     </a:solidFill>
                   </a:tcPr>
                 </a:tc>
@@ -9542,7 +9488,7 @@
                     <a:p>
                       <a:pPr algn="r" fontAlgn="b"/>
                       <a:r>
-                        <a:rPr lang="en-US" sz="1600" b="1" i="0" u="none" strike="noStrike" dirty="0">
+                        <a:rPr lang="en-US" sz="1600" b="0" i="0" u="none" strike="noStrike" dirty="0">
                           <a:solidFill>
                             <a:srgbClr val="000000"/>
                           </a:solidFill>
@@ -9591,10 +9537,7 @@
                       <a:tailEnd type="none" w="med" len="med"/>
                     </a:lnB>
                     <a:solidFill>
-                      <a:schemeClr val="accent1">
-                        <a:lumMod val="20000"/>
-                        <a:lumOff val="80000"/>
-                      </a:schemeClr>
+                      <a:srgbClr val="B6D8E8"/>
                     </a:solidFill>
                   </a:tcPr>
                 </a:tc>
@@ -9607,13 +9550,13 @@
                         <a:buNone/>
                       </a:pPr>
                       <a:r>
-                        <a:rPr lang="en-US" sz="1600" b="1" dirty="0">
+                        <a:rPr lang="en-US" sz="1600" b="0" dirty="0">
                           <a:effectLst/>
                           <a:latin typeface="Fira Sans"/>
                         </a:rPr>
                         <a:t>3.2570</a:t>
                       </a:r>
-                      <a:endParaRPr lang="en-US" sz="1600" b="1">
+                      <a:endParaRPr lang="en-US" sz="1600" b="0" dirty="0">
                         <a:latin typeface="Fira Sans"/>
                       </a:endParaRPr>
                     </a:p>
@@ -9640,10 +9583,7 @@
                       </a:solidFill>
                     </a:lnB>
                     <a:solidFill>
-                      <a:schemeClr val="accent1">
-                        <a:lumMod val="20000"/>
-                        <a:lumOff val="80000"/>
-                      </a:schemeClr>
+                      <a:srgbClr val="B6D8E8"/>
                     </a:solidFill>
                   </a:tcPr>
                 </a:tc>
@@ -9654,7 +9594,7 @@
                     <a:p>
                       <a:pPr algn="r" fontAlgn="b"/>
                       <a:r>
-                        <a:rPr lang="en-US" sz="1600" b="1" i="0" u="none" strike="noStrike" dirty="0">
+                        <a:rPr lang="en-US" sz="1600" b="0" i="0" u="none" strike="noStrike" dirty="0">
                           <a:solidFill>
                             <a:srgbClr val="000000"/>
                           </a:solidFill>
@@ -9703,10 +9643,7 @@
                       <a:tailEnd type="none" w="med" len="med"/>
                     </a:lnB>
                     <a:solidFill>
-                      <a:schemeClr val="accent1">
-                        <a:lumMod val="20000"/>
-                        <a:lumOff val="80000"/>
-                      </a:schemeClr>
+                      <a:srgbClr val="B6D8E8"/>
                     </a:solidFill>
                   </a:tcPr>
                 </a:tc>
@@ -9797,7 +9734,7 @@
                     <a:p>
                       <a:pPr marL="0" algn="l" defTabSz="914400" rtl="0" eaLnBrk="1" latinLnBrk="0" hangingPunct="1"/>
                       <a:r>
-                        <a:rPr lang="en-US" sz="1600" dirty="0">
+                        <a:rPr lang="en-US" sz="1600" b="0" dirty="0">
                           <a:solidFill>
                             <a:schemeClr val="tx1"/>
                           </a:solidFill>
@@ -10057,7 +9994,7 @@
                         </a:rPr>
                         <a:t>3.3378</a:t>
                       </a:r>
-                      <a:endParaRPr lang="en-US" sz="1600" b="0">
+                      <a:endParaRPr lang="en-US" sz="1600" b="0" dirty="0">
                         <a:latin typeface="Fira Sans"/>
                       </a:endParaRPr>
                     </a:p>
@@ -10227,10 +10164,7 @@
                       <a:tailEnd type="none" w="med" len="med"/>
                     </a:lnB>
                     <a:solidFill>
-                      <a:schemeClr val="accent1">
-                        <a:lumMod val="20000"/>
-                        <a:lumOff val="80000"/>
-                      </a:schemeClr>
+                      <a:srgbClr val="B6D8E8"/>
                     </a:solidFill>
                   </a:tcPr>
                 </a:tc>
@@ -10241,7 +10175,7 @@
                     <a:p>
                       <a:pPr marL="0" algn="l" defTabSz="914400" rtl="0" eaLnBrk="1" latinLnBrk="0" hangingPunct="1"/>
                       <a:r>
-                        <a:rPr lang="en-US" sz="1600" dirty="0">
+                        <a:rPr lang="en-US" sz="1600" b="0" dirty="0">
                           <a:solidFill>
                             <a:schemeClr val="tx1"/>
                           </a:solidFill>
@@ -10290,10 +10224,7 @@
                       <a:tailEnd type="none" w="med" len="med"/>
                     </a:lnB>
                     <a:solidFill>
-                      <a:schemeClr val="accent1">
-                        <a:lumMod val="20000"/>
-                        <a:lumOff val="80000"/>
-                      </a:schemeClr>
+                      <a:srgbClr val="B6D8E8"/>
                     </a:solidFill>
                   </a:tcPr>
                 </a:tc>
@@ -10353,10 +10284,7 @@
                       <a:tailEnd type="none" w="med" len="med"/>
                     </a:lnB>
                     <a:solidFill>
-                      <a:schemeClr val="accent1">
-                        <a:lumMod val="20000"/>
-                        <a:lumOff val="80000"/>
-                      </a:schemeClr>
+                      <a:srgbClr val="B6D8E8"/>
                     </a:solidFill>
                   </a:tcPr>
                 </a:tc>
@@ -10416,10 +10344,7 @@
                       <a:tailEnd type="none" w="med" len="med"/>
                     </a:lnB>
                     <a:solidFill>
-                      <a:schemeClr val="accent1">
-                        <a:lumMod val="20000"/>
-                        <a:lumOff val="80000"/>
-                      </a:schemeClr>
+                      <a:srgbClr val="B6D8E8"/>
                     </a:solidFill>
                   </a:tcPr>
                 </a:tc>
@@ -10479,10 +10404,7 @@
                       <a:tailEnd type="none" w="med" len="med"/>
                     </a:lnB>
                     <a:solidFill>
-                      <a:schemeClr val="accent1">
-                        <a:lumMod val="20000"/>
-                        <a:lumOff val="80000"/>
-                      </a:schemeClr>
+                      <a:srgbClr val="B6D8E8"/>
                     </a:solidFill>
                   </a:tcPr>
                 </a:tc>
@@ -10495,13 +10417,13 @@
                         <a:buNone/>
                       </a:pPr>
                       <a:r>
-                        <a:rPr lang="en-US" sz="1600" dirty="0">
+                        <a:rPr lang="en-US" sz="1600" b="0" dirty="0">
                           <a:effectLst/>
                           <a:latin typeface="Fira Sans"/>
                         </a:rPr>
                         <a:t>3.3770</a:t>
                       </a:r>
-                      <a:endParaRPr lang="en-US" sz="1600" dirty="0">
+                      <a:endParaRPr lang="en-US" sz="1600" b="0" dirty="0">
                         <a:latin typeface="Fira Sans"/>
                       </a:endParaRPr>
                     </a:p>
@@ -10528,10 +10450,7 @@
                       </a:solidFill>
                     </a:lnB>
                     <a:solidFill>
-                      <a:schemeClr val="accent1">
-                        <a:lumMod val="20000"/>
-                        <a:lumOff val="80000"/>
-                      </a:schemeClr>
+                      <a:srgbClr val="B6D8E8"/>
                     </a:solidFill>
                   </a:tcPr>
                 </a:tc>
@@ -10591,10 +10510,7 @@
                       <a:tailEnd type="none" w="med" len="med"/>
                     </a:lnB>
                     <a:solidFill>
-                      <a:schemeClr val="accent1">
-                        <a:lumMod val="20000"/>
-                        <a:lumOff val="80000"/>
-                      </a:schemeClr>
+                      <a:srgbClr val="B6D8E8"/>
                     </a:solidFill>
                   </a:tcPr>
                 </a:tc>
@@ -10622,7 +10538,7 @@
                         </a:spcAft>
                       </a:pPr>
                       <a:r>
-                        <a:rPr lang="en-US" sz="1600" b="1" i="0" u="none" strike="noStrike" dirty="0">
+                        <a:rPr lang="en-US" sz="1600" b="0" i="0" u="none" strike="noStrike" dirty="0">
                           <a:solidFill>
                             <a:srgbClr val="000000"/>
                           </a:solidFill>
@@ -10685,7 +10601,7 @@
                     <a:p>
                       <a:pPr marL="0" algn="l" defTabSz="914400" rtl="0" eaLnBrk="1" latinLnBrk="0" hangingPunct="1"/>
                       <a:r>
-                        <a:rPr lang="en-US" sz="1600" b="1" dirty="0">
+                        <a:rPr lang="en-US" sz="1600" b="0" dirty="0">
                           <a:solidFill>
                             <a:schemeClr val="tx1"/>
                           </a:solidFill>
@@ -10748,7 +10664,7 @@
                     <a:p>
                       <a:pPr algn="r" fontAlgn="b"/>
                       <a:r>
-                        <a:rPr lang="en-US" sz="1600" b="1" i="0" u="none" strike="noStrike" dirty="0">
+                        <a:rPr lang="en-US" sz="1600" b="0" i="0" u="none" strike="noStrike" dirty="0">
                           <a:solidFill>
                             <a:srgbClr val="000000"/>
                           </a:solidFill>
@@ -10811,7 +10727,7 @@
                     <a:p>
                       <a:pPr algn="r" fontAlgn="b"/>
                       <a:r>
-                        <a:rPr lang="en-US" sz="1600" b="1" i="0" u="none" strike="noStrike" dirty="0">
+                        <a:rPr lang="en-US" sz="1600" b="0" i="0" u="none" strike="noStrike" dirty="0">
                           <a:solidFill>
                             <a:srgbClr val="000000"/>
                           </a:solidFill>
@@ -10874,7 +10790,7 @@
                     <a:p>
                       <a:pPr algn="r" fontAlgn="b"/>
                       <a:r>
-                        <a:rPr lang="en-US" sz="1600" b="1" i="0" u="none" strike="noStrike" dirty="0">
+                        <a:rPr lang="en-US" sz="1600" b="0" i="0" u="none" strike="noStrike" dirty="0">
                           <a:solidFill>
                             <a:srgbClr val="000000"/>
                           </a:solidFill>
@@ -10939,13 +10855,13 @@
                         <a:buNone/>
                       </a:pPr>
                       <a:r>
-                        <a:rPr lang="en-US" sz="1600" b="1" dirty="0">
+                        <a:rPr lang="en-US" sz="1600" b="0" dirty="0">
                           <a:effectLst/>
                           <a:latin typeface="Fira Sans"/>
                         </a:rPr>
                         <a:t>3.3132</a:t>
                       </a:r>
-                      <a:endParaRPr lang="en-US" sz="1600" b="1">
+                      <a:endParaRPr lang="en-US" sz="1600" b="0">
                         <a:latin typeface="Fira Sans"/>
                       </a:endParaRPr>
                     </a:p>
@@ -10986,7 +10902,7 @@
                     <a:p>
                       <a:pPr algn="r" fontAlgn="b"/>
                       <a:r>
-                        <a:rPr lang="en-US" sz="1600" b="1" i="0" u="none" strike="noStrike" dirty="0">
+                        <a:rPr lang="en-US" sz="1600" b="0" i="0" u="none" strike="noStrike" dirty="0">
                           <a:solidFill>
                             <a:srgbClr val="000000"/>
                           </a:solidFill>
@@ -11115,10 +11031,7 @@
                       <a:tailEnd type="none" w="med" len="med"/>
                     </a:lnB>
                     <a:solidFill>
-                      <a:schemeClr val="accent1">
-                        <a:lumMod val="20000"/>
-                        <a:lumOff val="80000"/>
-                      </a:schemeClr>
+                      <a:srgbClr val="B6D8E8"/>
                     </a:solidFill>
                   </a:tcPr>
                 </a:tc>
@@ -11129,7 +11042,7 @@
                     <a:p>
                       <a:pPr marL="0" algn="l" defTabSz="914400" rtl="0" eaLnBrk="1" latinLnBrk="0" hangingPunct="1"/>
                       <a:r>
-                        <a:rPr lang="en-US" sz="1600" dirty="0">
+                        <a:rPr lang="en-US" sz="1600" b="0" dirty="0">
                           <a:solidFill>
                             <a:schemeClr val="tx1"/>
                           </a:solidFill>
@@ -11178,10 +11091,7 @@
                       <a:tailEnd type="none" w="med" len="med"/>
                     </a:lnB>
                     <a:solidFill>
-                      <a:schemeClr val="accent1">
-                        <a:lumMod val="20000"/>
-                        <a:lumOff val="80000"/>
-                      </a:schemeClr>
+                      <a:srgbClr val="B6D8E8"/>
                     </a:solidFill>
                   </a:tcPr>
                 </a:tc>
@@ -11241,10 +11151,7 @@
                       <a:tailEnd type="none" w="med" len="med"/>
                     </a:lnB>
                     <a:solidFill>
-                      <a:schemeClr val="accent1">
-                        <a:lumMod val="20000"/>
-                        <a:lumOff val="80000"/>
-                      </a:schemeClr>
+                      <a:srgbClr val="B6D8E8"/>
                     </a:solidFill>
                   </a:tcPr>
                 </a:tc>
@@ -11304,10 +11211,7 @@
                       <a:tailEnd type="none" w="med" len="med"/>
                     </a:lnB>
                     <a:solidFill>
-                      <a:schemeClr val="accent1">
-                        <a:lumMod val="20000"/>
-                        <a:lumOff val="80000"/>
-                      </a:schemeClr>
+                      <a:srgbClr val="B6D8E8"/>
                     </a:solidFill>
                   </a:tcPr>
                 </a:tc>
@@ -11367,10 +11271,7 @@
                       <a:tailEnd type="none" w="med" len="med"/>
                     </a:lnB>
                     <a:solidFill>
-                      <a:schemeClr val="accent1">
-                        <a:lumMod val="20000"/>
-                        <a:lumOff val="80000"/>
-                      </a:schemeClr>
+                      <a:srgbClr val="B6D8E8"/>
                     </a:solidFill>
                   </a:tcPr>
                 </a:tc>
@@ -11383,13 +11284,13 @@
                         <a:buNone/>
                       </a:pPr>
                       <a:r>
-                        <a:rPr lang="en-US" sz="1600" dirty="0">
+                        <a:rPr lang="en-US" sz="1600" b="0" dirty="0">
                           <a:effectLst/>
                           <a:latin typeface="Fira Sans"/>
                         </a:rPr>
                         <a:t>3.3641</a:t>
                       </a:r>
-                      <a:endParaRPr lang="en-US" sz="1600">
+                      <a:endParaRPr lang="en-US" sz="1600" b="0" dirty="0">
                         <a:latin typeface="Fira Sans"/>
                       </a:endParaRPr>
                     </a:p>
@@ -11416,10 +11317,7 @@
                       </a:solidFill>
                     </a:lnB>
                     <a:solidFill>
-                      <a:schemeClr val="accent1">
-                        <a:lumMod val="20000"/>
-                        <a:lumOff val="80000"/>
-                      </a:schemeClr>
+                      <a:srgbClr val="B6D8E8"/>
                     </a:solidFill>
                   </a:tcPr>
                 </a:tc>
@@ -11479,10 +11377,7 @@
                       <a:tailEnd type="none" w="med" len="med"/>
                     </a:lnB>
                     <a:solidFill>
-                      <a:schemeClr val="accent1">
-                        <a:lumMod val="20000"/>
-                        <a:lumOff val="80000"/>
-                      </a:schemeClr>
+                      <a:srgbClr val="B6D8E8"/>
                     </a:solidFill>
                   </a:tcPr>
                 </a:tc>
@@ -11573,7 +11468,7 @@
                     <a:p>
                       <a:pPr marL="0" algn="l" defTabSz="914400" rtl="0" eaLnBrk="1" latinLnBrk="0" hangingPunct="1"/>
                       <a:r>
-                        <a:rPr lang="en-US" sz="1600" dirty="0">
+                        <a:rPr lang="en-US" sz="1600" b="0" dirty="0">
                           <a:solidFill>
                             <a:schemeClr val="tx1"/>
                           </a:solidFill>
@@ -11827,13 +11722,13 @@
                         <a:buNone/>
                       </a:pPr>
                       <a:r>
-                        <a:rPr lang="en-US" sz="1600" dirty="0">
+                        <a:rPr lang="en-US" sz="1600" b="0" dirty="0">
                           <a:effectLst/>
                           <a:latin typeface="Fira Sans"/>
                         </a:rPr>
                         <a:t>3.3778</a:t>
                       </a:r>
-                      <a:endParaRPr lang="en-US" sz="1600">
+                      <a:endParaRPr lang="en-US" sz="1600" b="0">
                         <a:latin typeface="Fira Sans"/>
                       </a:endParaRPr>
                     </a:p>
@@ -11940,71 +11835,6 @@
           </a:graphicData>
         </a:graphic>
       </p:graphicFrame>
-      <p:sp>
-        <p:nvSpPr>
-          <p:cNvPr id="3" name="Google Shape;89;p16">
-            <a:extLst>
-              <a:ext uri="{FF2B5EF4-FFF2-40B4-BE49-F238E27FC236}">
-                <a16:creationId xmlns:a16="http://schemas.microsoft.com/office/drawing/2014/main" id="{33002273-82F2-A84A-6BBB-A4FD211CDE03}"/>
-              </a:ext>
-            </a:extLst>
-          </p:cNvPr>
-          <p:cNvSpPr txBox="1">
-            <a:spLocks/>
-          </p:cNvSpPr>
-          <p:nvPr/>
-        </p:nvSpPr>
-        <p:spPr>
-          <a:xfrm>
-            <a:off x="119743" y="3209679"/>
-            <a:ext cx="1735530" cy="438642"/>
-          </a:xfrm>
-          <a:prstGeom prst="rect">
-            <a:avLst/>
-          </a:prstGeom>
-        </p:spPr>
-        <p:txBody>
-          <a:bodyPr spcFirstLastPara="1" vert="horz" wrap="square" lIns="91425" tIns="91425" rIns="91425" bIns="91425" rtlCol="0" anchor="t" anchorCtr="0">
-            <a:noAutofit/>
-          </a:bodyPr>
-          <a:lstStyle>
-            <a:lvl1pPr algn="l" defTabSz="914400" rtl="0" eaLnBrk="1" latinLnBrk="0" hangingPunct="1">
-              <a:lnSpc>
-                <a:spcPct val="90000"/>
-              </a:lnSpc>
-              <a:spcBef>
-                <a:spcPct val="0"/>
-              </a:spcBef>
-              <a:buNone/>
-              <a:defRPr sz="4400" kern="1200">
-                <a:solidFill>
-                  <a:schemeClr val="tx1"/>
-                </a:solidFill>
-                <a:latin typeface="+mj-lt"/>
-                <a:ea typeface="+mj-ea"/>
-                <a:cs typeface="+mj-cs"/>
-              </a:defRPr>
-            </a:lvl1pPr>
-          </a:lstStyle>
-          <a:p>
-            <a:pPr algn="thaiDist">
-              <a:spcBef>
-                <a:spcPts val="0"/>
-              </a:spcBef>
-            </a:pPr>
-            <a:r>
-              <a:rPr lang="en-US" sz="2000" b="1" i="1" dirty="0">
-                <a:solidFill>
-                  <a:schemeClr val="accent1"/>
-                </a:solidFill>
-                <a:latin typeface="Fira Sans" panose="020B0503050000020004" pitchFamily="34" charset="0"/>
-              </a:rPr>
-              <a:t>1 Step Ahead</a:t>
-            </a:r>
-            <a:endParaRPr lang="en-US"/>
-          </a:p>
-        </p:txBody>
-      </p:sp>
       <p:sp>
         <p:nvSpPr>
           <p:cNvPr id="5" name="Google Shape;89;p16">
@@ -12066,12 +11896,22 @@
               </a:rPr>
               <a:t>Loss Comparison</a:t>
             </a:r>
-            <a:endParaRPr lang="en-US" b="1" dirty="0">
-              <a:solidFill>
-                <a:schemeClr val="accent1"/>
-              </a:solidFill>
-              <a:latin typeface="Fira Sans" panose="020B0503050000020004" pitchFamily="34" charset="0"/>
-            </a:endParaRPr>
+          </a:p>
+          <a:p>
+            <a:pPr algn="thaiDist">
+              <a:spcBef>
+                <a:spcPts val="0"/>
+              </a:spcBef>
+            </a:pPr>
+            <a:r>
+              <a:rPr lang="en-US" sz="3200" b="1" i="1" dirty="0">
+                <a:solidFill>
+                  <a:schemeClr val="accent1"/>
+                </a:solidFill>
+                <a:latin typeface="Fira Sans" panose="020B0503050000020004" pitchFamily="34" charset="0"/>
+              </a:rPr>
+              <a:t>1 Step Ahead</a:t>
+            </a:r>
           </a:p>
         </p:txBody>
       </p:sp>
@@ -12218,13 +12058,13 @@
           <p:nvPr>
             <p:extLst>
               <p:ext uri="{D42A27DB-BD31-4B8C-83A1-F6EECF244321}">
-                <p14:modId xmlns:p14="http://schemas.microsoft.com/office/powerpoint/2010/main" val="800502248"/>
+                <p14:modId xmlns:p14="http://schemas.microsoft.com/office/powerpoint/2010/main" val="3278200357"/>
               </p:ext>
             </p:extLst>
           </p:nvPr>
         </p:nvGraphicFramePr>
         <p:xfrm>
-          <a:off x="1981584" y="1716076"/>
+          <a:off x="1107251" y="2210062"/>
           <a:ext cx="9977498" cy="3017520"/>
         </p:xfrm>
         <a:graphic>
@@ -13230,6 +13070,443 @@
                       <a:tailEnd type="none" w="med" len="med"/>
                     </a:lnB>
                     <a:solidFill>
+                      <a:srgbClr val="B6D8E8"/>
+                    </a:solidFill>
+                  </a:tcPr>
+                </a:tc>
+                <a:tc>
+                  <a:txBody>
+                    <a:bodyPr/>
+                    <a:lstStyle/>
+                    <a:p>
+                      <a:pPr marL="0" algn="l" defTabSz="914400" rtl="0" eaLnBrk="1" latinLnBrk="0" hangingPunct="1"/>
+                      <a:r>
+                        <a:rPr lang="en-US" sz="1600" b="0" dirty="0">
+                          <a:solidFill>
+                            <a:schemeClr val="tx1"/>
+                          </a:solidFill>
+                          <a:effectLst/>
+                          <a:latin typeface="Fira Sans"/>
+                        </a:rPr>
+                        <a:t>Fixed</a:t>
+                      </a:r>
+                    </a:p>
+                  </a:txBody>
+                  <a:tcPr anchor="ctr">
+                    <a:lnL w="12700" cap="flat" cmpd="sng" algn="ctr">
+                      <a:solidFill>
+                        <a:schemeClr val="bg1"/>
+                      </a:solidFill>
+                      <a:prstDash val="solid"/>
+                      <a:round/>
+                      <a:headEnd type="none" w="med" len="med"/>
+                      <a:tailEnd type="none" w="med" len="med"/>
+                    </a:lnL>
+                    <a:lnR w="12700" cap="flat" cmpd="sng" algn="ctr">
+                      <a:solidFill>
+                        <a:schemeClr val="bg1"/>
+                      </a:solidFill>
+                      <a:prstDash val="solid"/>
+                      <a:round/>
+                      <a:headEnd type="none" w="med" len="med"/>
+                      <a:tailEnd type="none" w="med" len="med"/>
+                    </a:lnR>
+                    <a:lnT w="12700" cap="flat" cmpd="sng" algn="ctr">
+                      <a:solidFill>
+                        <a:schemeClr val="bg1"/>
+                      </a:solidFill>
+                      <a:prstDash val="solid"/>
+                      <a:round/>
+                      <a:headEnd type="none" w="med" len="med"/>
+                      <a:tailEnd type="none" w="med" len="med"/>
+                    </a:lnT>
+                    <a:lnB w="12700" cap="flat" cmpd="sng" algn="ctr">
+                      <a:solidFill>
+                        <a:schemeClr val="bg1"/>
+                      </a:solidFill>
+                      <a:prstDash val="solid"/>
+                      <a:round/>
+                      <a:headEnd type="none" w="med" len="med"/>
+                      <a:tailEnd type="none" w="med" len="med"/>
+                    </a:lnB>
+                    <a:solidFill>
+                      <a:srgbClr val="B6D8E8"/>
+                    </a:solidFill>
+                  </a:tcPr>
+                </a:tc>
+                <a:tc>
+                  <a:txBody>
+                    <a:bodyPr/>
+                    <a:lstStyle/>
+                    <a:p>
+                      <a:pPr algn="r"/>
+                      <a:r>
+                        <a:rPr lang="en-US" sz="1600" b="0" dirty="0">
+                          <a:solidFill>
+                            <a:schemeClr val="tx1"/>
+                          </a:solidFill>
+                          <a:effectLst/>
+                          <a:latin typeface="Fira Sans"/>
+                        </a:rPr>
+                        <a:t>0.1003</a:t>
+                      </a:r>
+                    </a:p>
+                  </a:txBody>
+                  <a:tcPr anchor="ctr">
+                    <a:lnL w="12700" cap="flat" cmpd="sng" algn="ctr">
+                      <a:solidFill>
+                        <a:schemeClr val="bg1"/>
+                      </a:solidFill>
+                      <a:prstDash val="solid"/>
+                      <a:round/>
+                      <a:headEnd type="none" w="med" len="med"/>
+                      <a:tailEnd type="none" w="med" len="med"/>
+                    </a:lnL>
+                    <a:lnR w="12700" cap="flat" cmpd="sng" algn="ctr">
+                      <a:solidFill>
+                        <a:schemeClr val="bg1"/>
+                      </a:solidFill>
+                      <a:prstDash val="solid"/>
+                      <a:round/>
+                      <a:headEnd type="none" w="med" len="med"/>
+                      <a:tailEnd type="none" w="med" len="med"/>
+                    </a:lnR>
+                    <a:lnT w="12700" cap="flat" cmpd="sng" algn="ctr">
+                      <a:solidFill>
+                        <a:schemeClr val="bg1"/>
+                      </a:solidFill>
+                      <a:prstDash val="solid"/>
+                      <a:round/>
+                      <a:headEnd type="none" w="med" len="med"/>
+                      <a:tailEnd type="none" w="med" len="med"/>
+                    </a:lnT>
+                    <a:lnB w="12700" cap="flat" cmpd="sng" algn="ctr">
+                      <a:solidFill>
+                        <a:schemeClr val="bg1"/>
+                      </a:solidFill>
+                      <a:prstDash val="solid"/>
+                      <a:round/>
+                      <a:headEnd type="none" w="med" len="med"/>
+                      <a:tailEnd type="none" w="med" len="med"/>
+                    </a:lnB>
+                    <a:solidFill>
+                      <a:srgbClr val="B6D8E8"/>
+                    </a:solidFill>
+                  </a:tcPr>
+                </a:tc>
+                <a:tc>
+                  <a:txBody>
+                    <a:bodyPr/>
+                    <a:lstStyle/>
+                    <a:p>
+                      <a:pPr marL="0" algn="r" defTabSz="914400" rtl="0" eaLnBrk="1" latinLnBrk="0" hangingPunct="1"/>
+                      <a:r>
+                        <a:rPr lang="en-US" sz="1600" b="0" dirty="0">
+                          <a:solidFill>
+                            <a:schemeClr val="tx1"/>
+                          </a:solidFill>
+                          <a:effectLst/>
+                          <a:latin typeface="Fira Sans"/>
+                        </a:rPr>
+                        <a:t>NA</a:t>
+                      </a:r>
+                    </a:p>
+                  </a:txBody>
+                  <a:tcPr anchor="ctr">
+                    <a:lnL w="12700" cap="flat" cmpd="sng" algn="ctr">
+                      <a:solidFill>
+                        <a:schemeClr val="bg1"/>
+                      </a:solidFill>
+                      <a:prstDash val="solid"/>
+                      <a:round/>
+                      <a:headEnd type="none" w="med" len="med"/>
+                      <a:tailEnd type="none" w="med" len="med"/>
+                    </a:lnL>
+                    <a:lnR w="12700" cap="flat" cmpd="sng" algn="ctr">
+                      <a:solidFill>
+                        <a:schemeClr val="bg1"/>
+                      </a:solidFill>
+                      <a:prstDash val="solid"/>
+                      <a:round/>
+                      <a:headEnd type="none" w="med" len="med"/>
+                      <a:tailEnd type="none" w="med" len="med"/>
+                    </a:lnR>
+                    <a:lnT w="12700" cap="flat" cmpd="sng" algn="ctr">
+                      <a:solidFill>
+                        <a:schemeClr val="bg1"/>
+                      </a:solidFill>
+                      <a:prstDash val="solid"/>
+                      <a:round/>
+                      <a:headEnd type="none" w="med" len="med"/>
+                      <a:tailEnd type="none" w="med" len="med"/>
+                    </a:lnT>
+                    <a:lnB w="12700" cap="flat" cmpd="sng" algn="ctr">
+                      <a:solidFill>
+                        <a:schemeClr val="bg1"/>
+                      </a:solidFill>
+                      <a:prstDash val="solid"/>
+                      <a:round/>
+                      <a:headEnd type="none" w="med" len="med"/>
+                      <a:tailEnd type="none" w="med" len="med"/>
+                    </a:lnB>
+                    <a:solidFill>
+                      <a:srgbClr val="B6D8E8"/>
+                    </a:solidFill>
+                  </a:tcPr>
+                </a:tc>
+                <a:tc>
+                  <a:txBody>
+                    <a:bodyPr/>
+                    <a:lstStyle/>
+                    <a:p>
+                      <a:pPr marL="0" algn="r" defTabSz="914400" rtl="0" eaLnBrk="1" latinLnBrk="0" hangingPunct="1"/>
+                      <a:r>
+                        <a:rPr lang="en-US" sz="1600" b="0" dirty="0">
+                          <a:solidFill>
+                            <a:schemeClr val="tx1"/>
+                          </a:solidFill>
+                          <a:effectLst/>
+                          <a:latin typeface="Fira Sans"/>
+                        </a:rPr>
+                        <a:t>24.8000</a:t>
+                      </a:r>
+                    </a:p>
+                  </a:txBody>
+                  <a:tcPr anchor="ctr">
+                    <a:lnL w="12700" cap="flat" cmpd="sng" algn="ctr">
+                      <a:solidFill>
+                        <a:schemeClr val="bg1"/>
+                      </a:solidFill>
+                      <a:prstDash val="solid"/>
+                      <a:round/>
+                      <a:headEnd type="none" w="med" len="med"/>
+                      <a:tailEnd type="none" w="med" len="med"/>
+                    </a:lnL>
+                    <a:lnR w="12700" cap="flat" cmpd="sng" algn="ctr">
+                      <a:solidFill>
+                        <a:schemeClr val="bg1"/>
+                      </a:solidFill>
+                      <a:prstDash val="solid"/>
+                      <a:round/>
+                      <a:headEnd type="none" w="med" len="med"/>
+                      <a:tailEnd type="none" w="med" len="med"/>
+                    </a:lnR>
+                    <a:lnT w="12700" cap="flat" cmpd="sng" algn="ctr">
+                      <a:solidFill>
+                        <a:schemeClr val="bg1"/>
+                      </a:solidFill>
+                      <a:prstDash val="solid"/>
+                      <a:round/>
+                      <a:headEnd type="none" w="med" len="med"/>
+                      <a:tailEnd type="none" w="med" len="med"/>
+                    </a:lnT>
+                    <a:lnB w="12700" cap="flat" cmpd="sng" algn="ctr">
+                      <a:solidFill>
+                        <a:schemeClr val="bg1"/>
+                      </a:solidFill>
+                      <a:prstDash val="solid"/>
+                      <a:round/>
+                      <a:headEnd type="none" w="med" len="med"/>
+                      <a:tailEnd type="none" w="med" len="med"/>
+                    </a:lnB>
+                    <a:solidFill>
+                      <a:srgbClr val="B6D8E8"/>
+                    </a:solidFill>
+                  </a:tcPr>
+                </a:tc>
+                <a:tc>
+                  <a:txBody>
+                    <a:bodyPr/>
+                    <a:lstStyle/>
+                    <a:p>
+                      <a:pPr marL="0" algn="r" defTabSz="914400" rtl="0" eaLnBrk="1" latinLnBrk="0" hangingPunct="1"/>
+                      <a:r>
+                        <a:rPr lang="en-US" sz="1600" b="0" dirty="0">
+                          <a:solidFill>
+                            <a:schemeClr val="tx1"/>
+                          </a:solidFill>
+                          <a:effectLst/>
+                          <a:latin typeface="Fira Sans"/>
+                        </a:rPr>
+                        <a:t>3.2800</a:t>
+                      </a:r>
+                    </a:p>
+                  </a:txBody>
+                  <a:tcPr anchor="ctr">
+                    <a:lnL w="12700" cap="flat" cmpd="sng" algn="ctr">
+                      <a:solidFill>
+                        <a:schemeClr val="bg1"/>
+                      </a:solidFill>
+                      <a:prstDash val="solid"/>
+                      <a:round/>
+                      <a:headEnd type="none" w="med" len="med"/>
+                      <a:tailEnd type="none" w="med" len="med"/>
+                    </a:lnL>
+                    <a:lnR w="12700" cap="flat" cmpd="sng" algn="ctr">
+                      <a:solidFill>
+                        <a:schemeClr val="bg1"/>
+                      </a:solidFill>
+                      <a:prstDash val="solid"/>
+                      <a:round/>
+                      <a:headEnd type="none" w="med" len="med"/>
+                      <a:tailEnd type="none" w="med" len="med"/>
+                    </a:lnR>
+                    <a:lnT w="12700" cap="flat" cmpd="sng" algn="ctr">
+                      <a:solidFill>
+                        <a:schemeClr val="bg1"/>
+                      </a:solidFill>
+                      <a:prstDash val="solid"/>
+                      <a:round/>
+                      <a:headEnd type="none" w="med" len="med"/>
+                      <a:tailEnd type="none" w="med" len="med"/>
+                    </a:lnT>
+                    <a:lnB w="12700" cap="flat" cmpd="sng" algn="ctr">
+                      <a:solidFill>
+                        <a:schemeClr val="bg1"/>
+                      </a:solidFill>
+                      <a:prstDash val="solid"/>
+                      <a:round/>
+                      <a:headEnd type="none" w="med" len="med"/>
+                      <a:tailEnd type="none" w="med" len="med"/>
+                    </a:lnB>
+                    <a:solidFill>
+                      <a:srgbClr val="B6D8E8"/>
+                    </a:solidFill>
+                  </a:tcPr>
+                </a:tc>
+                <a:tc>
+                  <a:txBody>
+                    <a:bodyPr/>
+                    <a:lstStyle/>
+                    <a:p>
+                      <a:pPr marL="0" algn="r" defTabSz="914400" rtl="0" eaLnBrk="1" latinLnBrk="0" hangingPunct="1"/>
+                      <a:r>
+                        <a:rPr lang="en-US" sz="1600" b="0" dirty="0">
+                          <a:solidFill>
+                            <a:schemeClr val="tx1"/>
+                          </a:solidFill>
+                          <a:effectLst/>
+                          <a:latin typeface="Fira Sans"/>
+                        </a:rPr>
+                        <a:t>0.1001</a:t>
+                      </a:r>
+                    </a:p>
+                  </a:txBody>
+                  <a:tcPr anchor="ctr">
+                    <a:lnL w="12700" cap="flat" cmpd="sng" algn="ctr">
+                      <a:solidFill>
+                        <a:schemeClr val="bg1"/>
+                      </a:solidFill>
+                      <a:prstDash val="solid"/>
+                      <a:round/>
+                      <a:headEnd type="none" w="med" len="med"/>
+                      <a:tailEnd type="none" w="med" len="med"/>
+                    </a:lnL>
+                    <a:lnR w="12700" cap="flat" cmpd="sng" algn="ctr">
+                      <a:solidFill>
+                        <a:schemeClr val="bg1"/>
+                      </a:solidFill>
+                      <a:prstDash val="solid"/>
+                      <a:round/>
+                      <a:headEnd type="none" w="med" len="med"/>
+                      <a:tailEnd type="none" w="med" len="med"/>
+                    </a:lnR>
+                    <a:lnT w="12700" cap="flat" cmpd="sng" algn="ctr">
+                      <a:solidFill>
+                        <a:schemeClr val="bg1"/>
+                      </a:solidFill>
+                      <a:prstDash val="solid"/>
+                      <a:round/>
+                      <a:headEnd type="none" w="med" len="med"/>
+                      <a:tailEnd type="none" w="med" len="med"/>
+                    </a:lnT>
+                    <a:lnB w="12700" cap="flat" cmpd="sng" algn="ctr">
+                      <a:solidFill>
+                        <a:schemeClr val="bg1"/>
+                      </a:solidFill>
+                      <a:prstDash val="solid"/>
+                      <a:round/>
+                      <a:headEnd type="none" w="med" len="med"/>
+                      <a:tailEnd type="none" w="med" len="med"/>
+                    </a:lnB>
+                    <a:solidFill>
+                      <a:srgbClr val="B6D8E8"/>
+                    </a:solidFill>
+                  </a:tcPr>
+                </a:tc>
+                <a:extLst>
+                  <a:ext uri="{0D108BD9-81ED-4DB2-BD59-A6C34878D82A}">
+                    <a16:rowId xmlns:a16="http://schemas.microsoft.com/office/drawing/2014/main" val="1827571651"/>
+                  </a:ext>
+                </a:extLst>
+              </a:tr>
+              <a:tr h="0">
+                <a:tc>
+                  <a:txBody>
+                    <a:bodyPr/>
+                    <a:lstStyle/>
+                    <a:p>
+                      <a:pPr algn="l" fontAlgn="b">
+                        <a:lnSpc>
+                          <a:spcPct val="100000"/>
+                        </a:lnSpc>
+                        <a:spcBef>
+                          <a:spcPts val="600"/>
+                        </a:spcBef>
+                        <a:spcAft>
+                          <a:spcPts val="600"/>
+                        </a:spcAft>
+                      </a:pPr>
+                      <a:r>
+                        <a:rPr lang="en-US" sz="1600" b="0" i="0" u="none" strike="noStrike" dirty="0">
+                          <a:solidFill>
+                            <a:srgbClr val="000000"/>
+                          </a:solidFill>
+                          <a:effectLst/>
+                          <a:latin typeface="Fira Sans"/>
+                        </a:rPr>
+                        <a:t>ARMA(3,3)</a:t>
+                      </a:r>
+                    </a:p>
+                  </a:txBody>
+                  <a:tcPr anchor="ctr">
+                    <a:lnL w="12700" cap="flat" cmpd="sng" algn="ctr">
+                      <a:solidFill>
+                        <a:schemeClr val="bg1"/>
+                      </a:solidFill>
+                      <a:prstDash val="solid"/>
+                      <a:round/>
+                      <a:headEnd type="none" w="med" len="med"/>
+                      <a:tailEnd type="none" w="med" len="med"/>
+                    </a:lnL>
+                    <a:lnR w="12700" cap="flat" cmpd="sng" algn="ctr">
+                      <a:solidFill>
+                        <a:schemeClr val="bg1"/>
+                      </a:solidFill>
+                      <a:prstDash val="solid"/>
+                      <a:round/>
+                      <a:headEnd type="none" w="med" len="med"/>
+                      <a:tailEnd type="none" w="med" len="med"/>
+                    </a:lnR>
+                    <a:lnT w="12700" cap="flat" cmpd="sng" algn="ctr">
+                      <a:solidFill>
+                        <a:schemeClr val="bg1"/>
+                      </a:solidFill>
+                      <a:prstDash val="solid"/>
+                      <a:round/>
+                      <a:headEnd type="none" w="med" len="med"/>
+                      <a:tailEnd type="none" w="med" len="med"/>
+                    </a:lnT>
+                    <a:lnB w="12700" cap="flat" cmpd="sng" algn="ctr">
+                      <a:solidFill>
+                        <a:schemeClr val="bg1"/>
+                      </a:solidFill>
+                      <a:prstDash val="solid"/>
+                      <a:round/>
+                      <a:headEnd type="none" w="med" len="med"/>
+                      <a:tailEnd type="none" w="med" len="med"/>
+                    </a:lnB>
+                    <a:solidFill>
                       <a:schemeClr val="accent1">
                         <a:lumMod val="20000"/>
                         <a:lumOff val="80000"/>
@@ -13305,415 +13582,20 @@
                     <a:bodyPr/>
                     <a:lstStyle/>
                     <a:p>
-                      <a:pPr algn="r"/>
+                      <a:pPr algn="r" fontAlgn="b"/>
                       <a:r>
-                        <a:rPr lang="en-US" sz="1600" b="0" dirty="0">
-                          <a:solidFill>
-                            <a:schemeClr val="tx1"/>
-                          </a:solidFill>
-                          <a:effectLst/>
-                          <a:latin typeface="Fira Sans"/>
-                        </a:rPr>
-                        <a:t>0.1003</a:t>
-                      </a:r>
-                    </a:p>
-                  </a:txBody>
-                  <a:tcPr anchor="ctr">
-                    <a:lnL w="12700" cap="flat" cmpd="sng" algn="ctr">
-                      <a:solidFill>
-                        <a:schemeClr val="bg1"/>
-                      </a:solidFill>
-                      <a:prstDash val="solid"/>
-                      <a:round/>
-                      <a:headEnd type="none" w="med" len="med"/>
-                      <a:tailEnd type="none" w="med" len="med"/>
-                    </a:lnL>
-                    <a:lnR w="12700" cap="flat" cmpd="sng" algn="ctr">
-                      <a:solidFill>
-                        <a:schemeClr val="bg1"/>
-                      </a:solidFill>
-                      <a:prstDash val="solid"/>
-                      <a:round/>
-                      <a:headEnd type="none" w="med" len="med"/>
-                      <a:tailEnd type="none" w="med" len="med"/>
-                    </a:lnR>
-                    <a:lnT w="12700" cap="flat" cmpd="sng" algn="ctr">
-                      <a:solidFill>
-                        <a:schemeClr val="bg1"/>
-                      </a:solidFill>
-                      <a:prstDash val="solid"/>
-                      <a:round/>
-                      <a:headEnd type="none" w="med" len="med"/>
-                      <a:tailEnd type="none" w="med" len="med"/>
-                    </a:lnT>
-                    <a:lnB w="12700" cap="flat" cmpd="sng" algn="ctr">
-                      <a:solidFill>
-                        <a:schemeClr val="bg1"/>
-                      </a:solidFill>
-                      <a:prstDash val="solid"/>
-                      <a:round/>
-                      <a:headEnd type="none" w="med" len="med"/>
-                      <a:tailEnd type="none" w="med" len="med"/>
-                    </a:lnB>
-                    <a:solidFill>
-                      <a:schemeClr val="accent1">
-                        <a:lumMod val="20000"/>
-                        <a:lumOff val="80000"/>
-                      </a:schemeClr>
-                    </a:solidFill>
-                  </a:tcPr>
-                </a:tc>
-                <a:tc>
-                  <a:txBody>
-                    <a:bodyPr/>
-                    <a:lstStyle/>
-                    <a:p>
-                      <a:pPr marL="0" algn="r" defTabSz="914400" rtl="0" eaLnBrk="1" latinLnBrk="0" hangingPunct="1"/>
-                      <a:r>
-                        <a:rPr lang="en-US" sz="1600" b="0" dirty="0">
-                          <a:solidFill>
-                            <a:schemeClr val="tx1"/>
-                          </a:solidFill>
-                          <a:effectLst/>
-                          <a:latin typeface="Fira Sans"/>
-                        </a:rPr>
-                        <a:t>NA</a:t>
-                      </a:r>
-                    </a:p>
-                  </a:txBody>
-                  <a:tcPr anchor="ctr">
-                    <a:lnL w="12700" cap="flat" cmpd="sng" algn="ctr">
-                      <a:solidFill>
-                        <a:schemeClr val="bg1"/>
-                      </a:solidFill>
-                      <a:prstDash val="solid"/>
-                      <a:round/>
-                      <a:headEnd type="none" w="med" len="med"/>
-                      <a:tailEnd type="none" w="med" len="med"/>
-                    </a:lnL>
-                    <a:lnR w="12700" cap="flat" cmpd="sng" algn="ctr">
-                      <a:solidFill>
-                        <a:schemeClr val="bg1"/>
-                      </a:solidFill>
-                      <a:prstDash val="solid"/>
-                      <a:round/>
-                      <a:headEnd type="none" w="med" len="med"/>
-                      <a:tailEnd type="none" w="med" len="med"/>
-                    </a:lnR>
-                    <a:lnT w="12700" cap="flat" cmpd="sng" algn="ctr">
-                      <a:solidFill>
-                        <a:schemeClr val="bg1"/>
-                      </a:solidFill>
-                      <a:prstDash val="solid"/>
-                      <a:round/>
-                      <a:headEnd type="none" w="med" len="med"/>
-                      <a:tailEnd type="none" w="med" len="med"/>
-                    </a:lnT>
-                    <a:lnB w="12700" cap="flat" cmpd="sng" algn="ctr">
-                      <a:solidFill>
-                        <a:schemeClr val="bg1"/>
-                      </a:solidFill>
-                      <a:prstDash val="solid"/>
-                      <a:round/>
-                      <a:headEnd type="none" w="med" len="med"/>
-                      <a:tailEnd type="none" w="med" len="med"/>
-                    </a:lnB>
-                    <a:solidFill>
-                      <a:schemeClr val="accent1">
-                        <a:lumMod val="20000"/>
-                        <a:lumOff val="80000"/>
-                      </a:schemeClr>
-                    </a:solidFill>
-                  </a:tcPr>
-                </a:tc>
-                <a:tc>
-                  <a:txBody>
-                    <a:bodyPr/>
-                    <a:lstStyle/>
-                    <a:p>
-                      <a:pPr marL="0" algn="r" defTabSz="914400" rtl="0" eaLnBrk="1" latinLnBrk="0" hangingPunct="1"/>
-                      <a:r>
-                        <a:rPr lang="en-US" sz="1600" b="0" dirty="0">
-                          <a:solidFill>
-                            <a:schemeClr val="tx1"/>
-                          </a:solidFill>
-                          <a:effectLst/>
-                          <a:latin typeface="Fira Sans"/>
-                        </a:rPr>
-                        <a:t>24.8000</a:t>
-                      </a:r>
-                    </a:p>
-                  </a:txBody>
-                  <a:tcPr anchor="ctr">
-                    <a:lnL w="12700" cap="flat" cmpd="sng" algn="ctr">
-                      <a:solidFill>
-                        <a:schemeClr val="bg1"/>
-                      </a:solidFill>
-                      <a:prstDash val="solid"/>
-                      <a:round/>
-                      <a:headEnd type="none" w="med" len="med"/>
-                      <a:tailEnd type="none" w="med" len="med"/>
-                    </a:lnL>
-                    <a:lnR w="12700" cap="flat" cmpd="sng" algn="ctr">
-                      <a:solidFill>
-                        <a:schemeClr val="bg1"/>
-                      </a:solidFill>
-                      <a:prstDash val="solid"/>
-                      <a:round/>
-                      <a:headEnd type="none" w="med" len="med"/>
-                      <a:tailEnd type="none" w="med" len="med"/>
-                    </a:lnR>
-                    <a:lnT w="12700" cap="flat" cmpd="sng" algn="ctr">
-                      <a:solidFill>
-                        <a:schemeClr val="bg1"/>
-                      </a:solidFill>
-                      <a:prstDash val="solid"/>
-                      <a:round/>
-                      <a:headEnd type="none" w="med" len="med"/>
-                      <a:tailEnd type="none" w="med" len="med"/>
-                    </a:lnT>
-                    <a:lnB w="12700" cap="flat" cmpd="sng" algn="ctr">
-                      <a:solidFill>
-                        <a:schemeClr val="bg1"/>
-                      </a:solidFill>
-                      <a:prstDash val="solid"/>
-                      <a:round/>
-                      <a:headEnd type="none" w="med" len="med"/>
-                      <a:tailEnd type="none" w="med" len="med"/>
-                    </a:lnB>
-                    <a:solidFill>
-                      <a:schemeClr val="accent1">
-                        <a:lumMod val="20000"/>
-                        <a:lumOff val="80000"/>
-                      </a:schemeClr>
-                    </a:solidFill>
-                  </a:tcPr>
-                </a:tc>
-                <a:tc>
-                  <a:txBody>
-                    <a:bodyPr/>
-                    <a:lstStyle/>
-                    <a:p>
-                      <a:pPr marL="0" algn="r" defTabSz="914400" rtl="0" eaLnBrk="1" latinLnBrk="0" hangingPunct="1"/>
-                      <a:r>
-                        <a:rPr lang="en-US" sz="1600" b="0" dirty="0">
-                          <a:solidFill>
-                            <a:schemeClr val="tx1"/>
-                          </a:solidFill>
-                          <a:effectLst/>
-                          <a:latin typeface="Fira Sans"/>
-                        </a:rPr>
-                        <a:t>3.2800</a:t>
-                      </a:r>
-                    </a:p>
-                  </a:txBody>
-                  <a:tcPr anchor="ctr">
-                    <a:lnL w="12700" cap="flat" cmpd="sng" algn="ctr">
-                      <a:solidFill>
-                        <a:schemeClr val="bg1"/>
-                      </a:solidFill>
-                      <a:prstDash val="solid"/>
-                      <a:round/>
-                      <a:headEnd type="none" w="med" len="med"/>
-                      <a:tailEnd type="none" w="med" len="med"/>
-                    </a:lnL>
-                    <a:lnR w="12700" cap="flat" cmpd="sng" algn="ctr">
-                      <a:solidFill>
-                        <a:schemeClr val="bg1"/>
-                      </a:solidFill>
-                      <a:prstDash val="solid"/>
-                      <a:round/>
-                      <a:headEnd type="none" w="med" len="med"/>
-                      <a:tailEnd type="none" w="med" len="med"/>
-                    </a:lnR>
-                    <a:lnT w="12700" cap="flat" cmpd="sng" algn="ctr">
-                      <a:solidFill>
-                        <a:schemeClr val="bg1"/>
-                      </a:solidFill>
-                      <a:prstDash val="solid"/>
-                      <a:round/>
-                      <a:headEnd type="none" w="med" len="med"/>
-                      <a:tailEnd type="none" w="med" len="med"/>
-                    </a:lnT>
-                    <a:lnB w="12700" cap="flat" cmpd="sng" algn="ctr">
-                      <a:solidFill>
-                        <a:schemeClr val="bg1"/>
-                      </a:solidFill>
-                      <a:prstDash val="solid"/>
-                      <a:round/>
-                      <a:headEnd type="none" w="med" len="med"/>
-                      <a:tailEnd type="none" w="med" len="med"/>
-                    </a:lnB>
-                    <a:solidFill>
-                      <a:schemeClr val="accent1">
-                        <a:lumMod val="20000"/>
-                        <a:lumOff val="80000"/>
-                      </a:schemeClr>
-                    </a:solidFill>
-                  </a:tcPr>
-                </a:tc>
-                <a:tc>
-                  <a:txBody>
-                    <a:bodyPr/>
-                    <a:lstStyle/>
-                    <a:p>
-                      <a:pPr marL="0" algn="r" defTabSz="914400" rtl="0" eaLnBrk="1" latinLnBrk="0" hangingPunct="1"/>
-                      <a:r>
-                        <a:rPr lang="en-US" sz="1600" b="0" dirty="0">
-                          <a:solidFill>
-                            <a:schemeClr val="tx1"/>
-                          </a:solidFill>
-                          <a:effectLst/>
-                          <a:latin typeface="Fira Sans"/>
-                        </a:rPr>
-                        <a:t>0.1001</a:t>
-                      </a:r>
-                    </a:p>
-                  </a:txBody>
-                  <a:tcPr anchor="ctr">
-                    <a:lnL w="12700" cap="flat" cmpd="sng" algn="ctr">
-                      <a:solidFill>
-                        <a:schemeClr val="bg1"/>
-                      </a:solidFill>
-                      <a:prstDash val="solid"/>
-                      <a:round/>
-                      <a:headEnd type="none" w="med" len="med"/>
-                      <a:tailEnd type="none" w="med" len="med"/>
-                    </a:lnL>
-                    <a:lnR w="12700" cap="flat" cmpd="sng" algn="ctr">
-                      <a:solidFill>
-                        <a:schemeClr val="bg1"/>
-                      </a:solidFill>
-                      <a:prstDash val="solid"/>
-                      <a:round/>
-                      <a:headEnd type="none" w="med" len="med"/>
-                      <a:tailEnd type="none" w="med" len="med"/>
-                    </a:lnR>
-                    <a:lnT w="12700" cap="flat" cmpd="sng" algn="ctr">
-                      <a:solidFill>
-                        <a:schemeClr val="bg1"/>
-                      </a:solidFill>
-                      <a:prstDash val="solid"/>
-                      <a:round/>
-                      <a:headEnd type="none" w="med" len="med"/>
-                      <a:tailEnd type="none" w="med" len="med"/>
-                    </a:lnT>
-                    <a:lnB w="12700" cap="flat" cmpd="sng" algn="ctr">
-                      <a:solidFill>
-                        <a:schemeClr val="bg1"/>
-                      </a:solidFill>
-                      <a:prstDash val="solid"/>
-                      <a:round/>
-                      <a:headEnd type="none" w="med" len="med"/>
-                      <a:tailEnd type="none" w="med" len="med"/>
-                    </a:lnB>
-                    <a:solidFill>
-                      <a:schemeClr val="accent1">
-                        <a:lumMod val="20000"/>
-                        <a:lumOff val="80000"/>
-                      </a:schemeClr>
-                    </a:solidFill>
-                  </a:tcPr>
-                </a:tc>
-                <a:extLst>
-                  <a:ext uri="{0D108BD9-81ED-4DB2-BD59-A6C34878D82A}">
-                    <a16:rowId xmlns:a16="http://schemas.microsoft.com/office/drawing/2014/main" val="1827571651"/>
-                  </a:ext>
-                </a:extLst>
-              </a:tr>
-              <a:tr h="0">
-                <a:tc>
-                  <a:txBody>
-                    <a:bodyPr/>
-                    <a:lstStyle/>
-                    <a:p>
-                      <a:pPr algn="l" fontAlgn="b">
-                        <a:lnSpc>
-                          <a:spcPct val="100000"/>
-                        </a:lnSpc>
-                        <a:spcBef>
-                          <a:spcPts val="600"/>
-                        </a:spcBef>
-                        <a:spcAft>
-                          <a:spcPts val="600"/>
-                        </a:spcAft>
-                      </a:pPr>
-                      <a:r>
-                        <a:rPr lang="en-US" sz="1600" b="1" i="0" u="none" strike="noStrike" dirty="0">
+                        <a:rPr lang="en-US" sz="1600" b="0" i="0" u="none" strike="noStrike" dirty="0">
                           <a:solidFill>
                             <a:srgbClr val="000000"/>
                           </a:solidFill>
                           <a:effectLst/>
                           <a:latin typeface="Fira Sans"/>
                         </a:rPr>
-                        <a:t>ARMA(3,3)</a:t>
+                        <a:t>-0.1120</a:t>
                       </a:r>
                     </a:p>
                   </a:txBody>
-                  <a:tcPr anchor="ctr">
-                    <a:lnL w="12700" cap="flat" cmpd="sng" algn="ctr">
-                      <a:solidFill>
-                        <a:schemeClr val="bg1"/>
-                      </a:solidFill>
-                      <a:prstDash val="solid"/>
-                      <a:round/>
-                      <a:headEnd type="none" w="med" len="med"/>
-                      <a:tailEnd type="none" w="med" len="med"/>
-                    </a:lnL>
-                    <a:lnR w="12700" cap="flat" cmpd="sng" algn="ctr">
-                      <a:solidFill>
-                        <a:schemeClr val="bg1"/>
-                      </a:solidFill>
-                      <a:prstDash val="solid"/>
-                      <a:round/>
-                      <a:headEnd type="none" w="med" len="med"/>
-                      <a:tailEnd type="none" w="med" len="med"/>
-                    </a:lnR>
-                    <a:lnT w="12700" cap="flat" cmpd="sng" algn="ctr">
-                      <a:solidFill>
-                        <a:schemeClr val="bg1"/>
-                      </a:solidFill>
-                      <a:prstDash val="solid"/>
-                      <a:round/>
-                      <a:headEnd type="none" w="med" len="med"/>
-                      <a:tailEnd type="none" w="med" len="med"/>
-                    </a:lnT>
-                    <a:lnB w="12700" cap="flat" cmpd="sng" algn="ctr">
-                      <a:solidFill>
-                        <a:schemeClr val="bg1"/>
-                      </a:solidFill>
-                      <a:prstDash val="solid"/>
-                      <a:round/>
-                      <a:headEnd type="none" w="med" len="med"/>
-                      <a:tailEnd type="none" w="med" len="med"/>
-                    </a:lnB>
-                    <a:solidFill>
-                      <a:schemeClr val="accent1">
-                        <a:lumMod val="20000"/>
-                        <a:lumOff val="80000"/>
-                      </a:schemeClr>
-                    </a:solidFill>
-                  </a:tcPr>
-                </a:tc>
-                <a:tc>
-                  <a:txBody>
-                    <a:bodyPr/>
-                    <a:lstStyle/>
-                    <a:p>
-                      <a:pPr marL="0" algn="l" defTabSz="914400" rtl="0" eaLnBrk="1" latinLnBrk="0" hangingPunct="1"/>
-                      <a:r>
-                        <a:rPr lang="en-US" sz="1600" b="1" dirty="0">
-                          <a:solidFill>
-                            <a:schemeClr val="tx1"/>
-                          </a:solidFill>
-                          <a:effectLst/>
-                          <a:latin typeface="Fira Sans"/>
-                        </a:rPr>
-                        <a:t>Fixed</a:t>
-                      </a:r>
-                    </a:p>
-                  </a:txBody>
-                  <a:tcPr anchor="ctr">
+                  <a:tcPr anchor="b">
                     <a:lnL w="12700" cap="flat" cmpd="sng" algn="ctr">
                       <a:solidFill>
                         <a:schemeClr val="bg1"/>
@@ -13765,14 +13647,14 @@
                     <a:p>
                       <a:pPr algn="r" fontAlgn="b"/>
                       <a:r>
-                        <a:rPr lang="en-US" sz="1600" b="1" i="0" u="none" strike="noStrike" dirty="0">
+                        <a:rPr lang="en-US" sz="1600" b="0" i="0" u="none" strike="noStrike" dirty="0">
                           <a:solidFill>
                             <a:srgbClr val="000000"/>
                           </a:solidFill>
                           <a:effectLst/>
                           <a:latin typeface="Fira Sans"/>
                         </a:rPr>
-                        <a:t>-0.1120</a:t>
+                        <a:t>-2.5705</a:t>
                       </a:r>
                     </a:p>
                   </a:txBody>
@@ -13828,70 +13710,7 @@
                     <a:p>
                       <a:pPr algn="r" fontAlgn="b"/>
                       <a:r>
-                        <a:rPr lang="en-US" sz="1600" b="1" i="0" u="none" strike="noStrike" dirty="0">
-                          <a:solidFill>
-                            <a:srgbClr val="000000"/>
-                          </a:solidFill>
-                          <a:effectLst/>
-                          <a:latin typeface="Fira Sans"/>
-                        </a:rPr>
-                        <a:t>-2.5705</a:t>
-                      </a:r>
-                    </a:p>
-                  </a:txBody>
-                  <a:tcPr anchor="b">
-                    <a:lnL w="12700" cap="flat" cmpd="sng" algn="ctr">
-                      <a:solidFill>
-                        <a:schemeClr val="bg1"/>
-                      </a:solidFill>
-                      <a:prstDash val="solid"/>
-                      <a:round/>
-                      <a:headEnd type="none" w="med" len="med"/>
-                      <a:tailEnd type="none" w="med" len="med"/>
-                    </a:lnL>
-                    <a:lnR w="12700" cap="flat" cmpd="sng" algn="ctr">
-                      <a:solidFill>
-                        <a:schemeClr val="bg1"/>
-                      </a:solidFill>
-                      <a:prstDash val="solid"/>
-                      <a:round/>
-                      <a:headEnd type="none" w="med" len="med"/>
-                      <a:tailEnd type="none" w="med" len="med"/>
-                    </a:lnR>
-                    <a:lnT w="12700" cap="flat" cmpd="sng" algn="ctr">
-                      <a:solidFill>
-                        <a:schemeClr val="bg1"/>
-                      </a:solidFill>
-                      <a:prstDash val="solid"/>
-                      <a:round/>
-                      <a:headEnd type="none" w="med" len="med"/>
-                      <a:tailEnd type="none" w="med" len="med"/>
-                    </a:lnT>
-                    <a:lnB w="12700" cap="flat" cmpd="sng" algn="ctr">
-                      <a:solidFill>
-                        <a:schemeClr val="bg1"/>
-                      </a:solidFill>
-                      <a:prstDash val="solid"/>
-                      <a:round/>
-                      <a:headEnd type="none" w="med" len="med"/>
-                      <a:tailEnd type="none" w="med" len="med"/>
-                    </a:lnB>
-                    <a:solidFill>
-                      <a:schemeClr val="accent1">
-                        <a:lumMod val="20000"/>
-                        <a:lumOff val="80000"/>
-                      </a:schemeClr>
-                    </a:solidFill>
-                  </a:tcPr>
-                </a:tc>
-                <a:tc>
-                  <a:txBody>
-                    <a:bodyPr/>
-                    <a:lstStyle/>
-                    <a:p>
-                      <a:pPr algn="r" fontAlgn="b"/>
-                      <a:r>
-                        <a:rPr lang="en-US" sz="1600" b="1" i="0" u="none" strike="noStrike" dirty="0">
+                        <a:rPr lang="en-US" sz="1600" b="0" i="0" u="none" strike="noStrike" dirty="0">
                           <a:solidFill>
                             <a:srgbClr val="000000"/>
                           </a:solidFill>
@@ -13956,13 +13775,13 @@
                         <a:buNone/>
                       </a:pPr>
                       <a:r>
-                        <a:rPr lang="en-US" sz="1600" b="1" dirty="0">
+                        <a:rPr lang="en-US" sz="1600" b="0" dirty="0">
                           <a:effectLst/>
                           <a:latin typeface="Fira Sans"/>
                         </a:rPr>
                         <a:t>3.9093</a:t>
                       </a:r>
-                      <a:endParaRPr lang="en-US" sz="1600" b="1">
+                      <a:endParaRPr lang="en-US" sz="1600" b="0">
                         <a:latin typeface="Fira Sans"/>
                       </a:endParaRPr>
                     </a:p>
@@ -14003,7 +13822,7 @@
                     <a:p>
                       <a:pPr algn="r" fontAlgn="b"/>
                       <a:r>
-                        <a:rPr lang="en-US" sz="1600" b="1" i="0" u="none" strike="noStrike" dirty="0">
+                        <a:rPr lang="en-US" sz="1600" b="0" i="0" u="none" strike="noStrike" dirty="0">
                           <a:solidFill>
                             <a:srgbClr val="000000"/>
                           </a:solidFill>
@@ -14132,10 +13951,7 @@
                       <a:tailEnd type="none" w="med" len="med"/>
                     </a:lnB>
                     <a:solidFill>
-                      <a:schemeClr val="accent1">
-                        <a:lumMod val="20000"/>
-                        <a:lumOff val="80000"/>
-                      </a:schemeClr>
+                      <a:srgbClr val="B6D8E8"/>
                     </a:solidFill>
                   </a:tcPr>
                 </a:tc>
@@ -14195,10 +14011,7 @@
                       <a:tailEnd type="none" w="med" len="med"/>
                     </a:lnB>
                     <a:solidFill>
-                      <a:schemeClr val="accent1">
-                        <a:lumMod val="20000"/>
-                        <a:lumOff val="80000"/>
-                      </a:schemeClr>
+                      <a:srgbClr val="B6D8E8"/>
                     </a:solidFill>
                   </a:tcPr>
                 </a:tc>
@@ -14258,10 +14071,7 @@
                       <a:tailEnd type="none" w="med" len="med"/>
                     </a:lnB>
                     <a:solidFill>
-                      <a:schemeClr val="accent1">
-                        <a:lumMod val="20000"/>
-                        <a:lumOff val="80000"/>
-                      </a:schemeClr>
+                      <a:srgbClr val="B6D8E8"/>
                     </a:solidFill>
                   </a:tcPr>
                 </a:tc>
@@ -14321,10 +14131,7 @@
                       <a:tailEnd type="none" w="med" len="med"/>
                     </a:lnB>
                     <a:solidFill>
-                      <a:schemeClr val="accent1">
-                        <a:lumMod val="20000"/>
-                        <a:lumOff val="80000"/>
-                      </a:schemeClr>
+                      <a:srgbClr val="B6D8E8"/>
                     </a:solidFill>
                   </a:tcPr>
                 </a:tc>
@@ -14384,10 +14191,7 @@
                       <a:tailEnd type="none" w="med" len="med"/>
                     </a:lnB>
                     <a:solidFill>
-                      <a:schemeClr val="accent1">
-                        <a:lumMod val="20000"/>
-                        <a:lumOff val="80000"/>
-                      </a:schemeClr>
+                      <a:srgbClr val="B6D8E8"/>
                     </a:solidFill>
                   </a:tcPr>
                 </a:tc>
@@ -14406,7 +14210,7 @@
                         </a:rPr>
                         <a:t>3.6589</a:t>
                       </a:r>
-                      <a:endParaRPr lang="en-US" sz="1600" b="0">
+                      <a:endParaRPr lang="en-US" sz="1600" b="0" dirty="0">
                         <a:latin typeface="Fira Sans"/>
                       </a:endParaRPr>
                     </a:p>
@@ -14433,10 +14237,7 @@
                       </a:solidFill>
                     </a:lnB>
                     <a:solidFill>
-                      <a:schemeClr val="accent1">
-                        <a:lumMod val="20000"/>
-                        <a:lumOff val="80000"/>
-                      </a:schemeClr>
+                      <a:srgbClr val="B6D8E8"/>
                     </a:solidFill>
                   </a:tcPr>
                 </a:tc>
@@ -14496,10 +14297,7 @@
                       <a:tailEnd type="none" w="med" len="med"/>
                     </a:lnB>
                     <a:solidFill>
-                      <a:schemeClr val="accent1">
-                        <a:lumMod val="20000"/>
-                        <a:lumOff val="80000"/>
-                      </a:schemeClr>
+                      <a:srgbClr val="B6D8E8"/>
                     </a:solidFill>
                   </a:tcPr>
                 </a:tc>
@@ -14971,7 +14769,7 @@
                         </a:spcAft>
                       </a:pPr>
                       <a:r>
-                        <a:rPr lang="en-US" sz="1600" b="1" i="0" u="none" strike="noStrike" dirty="0">
+                        <a:rPr lang="en-US" sz="1600" b="0" i="0" u="none" strike="noStrike" dirty="0">
                           <a:solidFill>
                             <a:srgbClr val="000000"/>
                           </a:solidFill>
@@ -15020,10 +14818,7 @@
                       <a:tailEnd type="none" w="med" len="med"/>
                     </a:lnB>
                     <a:solidFill>
-                      <a:schemeClr val="accent1">
-                        <a:lumMod val="20000"/>
-                        <a:lumOff val="80000"/>
-                      </a:schemeClr>
+                      <a:srgbClr val="B6D8E8"/>
                     </a:solidFill>
                   </a:tcPr>
                 </a:tc>
@@ -15034,7 +14829,7 @@
                     <a:p>
                       <a:pPr marL="0" algn="l" defTabSz="914400" rtl="0" eaLnBrk="1" latinLnBrk="0" hangingPunct="1"/>
                       <a:r>
-                        <a:rPr lang="en-US" sz="1600" b="1" dirty="0">
+                        <a:rPr lang="en-US" sz="1600" b="0" dirty="0">
                           <a:solidFill>
                             <a:schemeClr val="tx1"/>
                           </a:solidFill>
@@ -15083,10 +14878,7 @@
                       <a:tailEnd type="none" w="med" len="med"/>
                     </a:lnB>
                     <a:solidFill>
-                      <a:schemeClr val="accent1">
-                        <a:lumMod val="20000"/>
-                        <a:lumOff val="80000"/>
-                      </a:schemeClr>
+                      <a:srgbClr val="B6D8E8"/>
                     </a:solidFill>
                   </a:tcPr>
                 </a:tc>
@@ -15097,7 +14889,7 @@
                     <a:p>
                       <a:pPr algn="r" fontAlgn="b"/>
                       <a:r>
-                        <a:rPr lang="en-US" sz="1600" b="1" i="0" u="none" strike="noStrike" dirty="0">
+                        <a:rPr lang="en-US" sz="1600" b="0" i="0" u="none" strike="noStrike" dirty="0">
                           <a:solidFill>
                             <a:srgbClr val="000000"/>
                           </a:solidFill>
@@ -15146,10 +14938,7 @@
                       <a:tailEnd type="none" w="med" len="med"/>
                     </a:lnB>
                     <a:solidFill>
-                      <a:schemeClr val="accent1">
-                        <a:lumMod val="20000"/>
-                        <a:lumOff val="80000"/>
-                      </a:schemeClr>
+                      <a:srgbClr val="B6D8E8"/>
                     </a:solidFill>
                   </a:tcPr>
                 </a:tc>
@@ -15160,7 +14949,7 @@
                     <a:p>
                       <a:pPr algn="r" fontAlgn="b"/>
                       <a:r>
-                        <a:rPr lang="en-US" sz="1600" b="1" i="0" u="none" strike="noStrike" dirty="0">
+                        <a:rPr lang="en-US" sz="1600" b="0" i="0" u="none" strike="noStrike" dirty="0">
                           <a:solidFill>
                             <a:srgbClr val="000000"/>
                           </a:solidFill>
@@ -15209,10 +14998,7 @@
                       <a:tailEnd type="none" w="med" len="med"/>
                     </a:lnB>
                     <a:solidFill>
-                      <a:schemeClr val="accent1">
-                        <a:lumMod val="20000"/>
-                        <a:lumOff val="80000"/>
-                      </a:schemeClr>
+                      <a:srgbClr val="B6D8E8"/>
                     </a:solidFill>
                   </a:tcPr>
                 </a:tc>
@@ -15223,7 +15009,7 @@
                     <a:p>
                       <a:pPr algn="r" fontAlgn="b"/>
                       <a:r>
-                        <a:rPr lang="en-US" sz="1600" b="1" i="0" u="none" strike="noStrike" dirty="0">
+                        <a:rPr lang="en-US" sz="1600" b="0" i="0" u="none" strike="noStrike" dirty="0">
                           <a:solidFill>
                             <a:srgbClr val="000000"/>
                           </a:solidFill>
@@ -15272,10 +15058,7 @@
                       <a:tailEnd type="none" w="med" len="med"/>
                     </a:lnB>
                     <a:solidFill>
-                      <a:schemeClr val="accent1">
-                        <a:lumMod val="20000"/>
-                        <a:lumOff val="80000"/>
-                      </a:schemeClr>
+                      <a:srgbClr val="B6D8E8"/>
                     </a:solidFill>
                   </a:tcPr>
                 </a:tc>
@@ -15288,13 +15071,13 @@
                         <a:buNone/>
                       </a:pPr>
                       <a:r>
-                        <a:rPr lang="en-US" sz="1600" b="1" dirty="0">
+                        <a:rPr lang="en-US" sz="1600" b="0" dirty="0">
                           <a:effectLst/>
                           <a:latin typeface="Fira Sans"/>
                         </a:rPr>
                         <a:t>3.3358</a:t>
                       </a:r>
-                      <a:endParaRPr lang="en-US" sz="1600" b="1">
+                      <a:endParaRPr lang="en-US" sz="1600" b="0" dirty="0">
                         <a:latin typeface="Fira Sans"/>
                       </a:endParaRPr>
                     </a:p>
@@ -15321,10 +15104,7 @@
                       </a:solidFill>
                     </a:lnB>
                     <a:solidFill>
-                      <a:schemeClr val="accent1">
-                        <a:lumMod val="20000"/>
-                        <a:lumOff val="80000"/>
-                      </a:schemeClr>
+                      <a:srgbClr val="B6D8E8"/>
                     </a:solidFill>
                   </a:tcPr>
                 </a:tc>
@@ -15335,7 +15115,7 @@
                     <a:p>
                       <a:pPr algn="r" fontAlgn="b"/>
                       <a:r>
-                        <a:rPr lang="en-US" sz="1600" b="1" i="0" u="none" strike="noStrike" dirty="0">
+                        <a:rPr lang="en-US" sz="1600" b="0" i="0" u="none" strike="noStrike" dirty="0">
                           <a:solidFill>
                             <a:srgbClr val="000000"/>
                           </a:solidFill>
@@ -15384,10 +15164,7 @@
                       <a:tailEnd type="none" w="med" len="med"/>
                     </a:lnB>
                     <a:solidFill>
-                      <a:schemeClr val="accent1">
-                        <a:lumMod val="20000"/>
-                        <a:lumOff val="80000"/>
-                      </a:schemeClr>
+                      <a:srgbClr val="B6D8E8"/>
                     </a:solidFill>
                   </a:tcPr>
                 </a:tc>
@@ -15908,10 +15685,7 @@
                       <a:tailEnd type="none" w="med" len="med"/>
                     </a:lnB>
                     <a:solidFill>
-                      <a:schemeClr val="accent1">
-                        <a:lumMod val="20000"/>
-                        <a:lumOff val="80000"/>
-                      </a:schemeClr>
+                      <a:srgbClr val="B6D8E8"/>
                     </a:solidFill>
                   </a:tcPr>
                 </a:tc>
@@ -15971,10 +15745,7 @@
                       <a:tailEnd type="none" w="med" len="med"/>
                     </a:lnB>
                     <a:solidFill>
-                      <a:schemeClr val="accent1">
-                        <a:lumMod val="20000"/>
-                        <a:lumOff val="80000"/>
-                      </a:schemeClr>
+                      <a:srgbClr val="B6D8E8"/>
                     </a:solidFill>
                   </a:tcPr>
                 </a:tc>
@@ -16034,10 +15805,7 @@
                       <a:tailEnd type="none" w="med" len="med"/>
                     </a:lnB>
                     <a:solidFill>
-                      <a:schemeClr val="accent1">
-                        <a:lumMod val="20000"/>
-                        <a:lumOff val="80000"/>
-                      </a:schemeClr>
+                      <a:srgbClr val="B6D8E8"/>
                     </a:solidFill>
                   </a:tcPr>
                 </a:tc>
@@ -16097,10 +15865,7 @@
                       <a:tailEnd type="none" w="med" len="med"/>
                     </a:lnB>
                     <a:solidFill>
-                      <a:schemeClr val="accent1">
-                        <a:lumMod val="20000"/>
-                        <a:lumOff val="80000"/>
-                      </a:schemeClr>
+                      <a:srgbClr val="B6D8E8"/>
                     </a:solidFill>
                   </a:tcPr>
                 </a:tc>
@@ -16160,10 +15925,7 @@
                       <a:tailEnd type="none" w="med" len="med"/>
                     </a:lnB>
                     <a:solidFill>
-                      <a:schemeClr val="accent1">
-                        <a:lumMod val="20000"/>
-                        <a:lumOff val="80000"/>
-                      </a:schemeClr>
+                      <a:srgbClr val="B6D8E8"/>
                     </a:solidFill>
                   </a:tcPr>
                 </a:tc>
@@ -16182,7 +15944,7 @@
                         </a:rPr>
                         <a:t>3.2988</a:t>
                       </a:r>
-                      <a:endParaRPr lang="en-US" sz="1600" b="0">
+                      <a:endParaRPr lang="en-US" sz="1600" b="0" dirty="0">
                         <a:latin typeface="Fira Sans"/>
                       </a:endParaRPr>
                     </a:p>
@@ -16209,10 +15971,7 @@
                       </a:solidFill>
                     </a:lnB>
                     <a:solidFill>
-                      <a:schemeClr val="accent1">
-                        <a:lumMod val="20000"/>
-                        <a:lumOff val="80000"/>
-                      </a:schemeClr>
+                      <a:srgbClr val="B6D8E8"/>
                     </a:solidFill>
                   </a:tcPr>
                 </a:tc>
@@ -16272,10 +16031,7 @@
                       <a:tailEnd type="none" w="med" len="med"/>
                     </a:lnB>
                     <a:solidFill>
-                      <a:schemeClr val="accent1">
-                        <a:lumMod val="20000"/>
-                        <a:lumOff val="80000"/>
-                      </a:schemeClr>
+                      <a:srgbClr val="B6D8E8"/>
                     </a:solidFill>
                   </a:tcPr>
                 </a:tc>
@@ -16350,82 +16106,22 @@
               </a:rPr>
               <a:t>Loss Comparison</a:t>
             </a:r>
-            <a:endParaRPr lang="en-US" b="1" dirty="0">
-              <a:solidFill>
-                <a:schemeClr val="accent1"/>
-              </a:solidFill>
-              <a:latin typeface="Fira Sans" panose="020B0503050000020004" pitchFamily="34" charset="0"/>
-            </a:endParaRPr>
           </a:p>
-        </p:txBody>
-      </p:sp>
-      <p:sp>
-        <p:nvSpPr>
-          <p:cNvPr id="8" name="Google Shape;89;p16">
-            <a:extLst>
-              <a:ext uri="{FF2B5EF4-FFF2-40B4-BE49-F238E27FC236}">
-                <a16:creationId xmlns:a16="http://schemas.microsoft.com/office/drawing/2014/main" id="{17AA5531-A0AA-6F90-B63C-D11F6EF3B536}"/>
-              </a:ext>
-            </a:extLst>
-          </p:cNvPr>
-          <p:cNvSpPr txBox="1">
-            <a:spLocks/>
-          </p:cNvSpPr>
-          <p:nvPr/>
-        </p:nvSpPr>
-        <p:spPr>
-          <a:xfrm>
-            <a:off x="119743" y="3229385"/>
-            <a:ext cx="1847202" cy="418936"/>
-          </a:xfrm>
-          <a:prstGeom prst="rect">
-            <a:avLst/>
-          </a:prstGeom>
-        </p:spPr>
-        <p:txBody>
-          <a:bodyPr spcFirstLastPara="1" vert="horz" wrap="square" lIns="91425" tIns="91425" rIns="91425" bIns="91425" rtlCol="0" anchor="t" anchorCtr="0">
-            <a:noAutofit/>
-          </a:bodyPr>
-          <a:lstStyle>
-            <a:lvl1pPr algn="l" defTabSz="914400" rtl="0" eaLnBrk="1" latinLnBrk="0" hangingPunct="1">
-              <a:lnSpc>
-                <a:spcPct val="90000"/>
-              </a:lnSpc>
-              <a:spcBef>
-                <a:spcPct val="0"/>
-              </a:spcBef>
-              <a:buNone/>
-              <a:defRPr sz="4400" kern="1200">
-                <a:solidFill>
-                  <a:schemeClr val="tx1"/>
-                </a:solidFill>
-                <a:latin typeface="+mj-lt"/>
-                <a:ea typeface="+mj-ea"/>
-                <a:cs typeface="+mj-cs"/>
-              </a:defRPr>
-            </a:lvl1pPr>
-          </a:lstStyle>
           <a:p>
-            <a:pPr>
+            <a:pPr algn="thaiDist">
               <a:spcBef>
                 <a:spcPts val="0"/>
               </a:spcBef>
             </a:pPr>
             <a:r>
-              <a:rPr lang="en-US" sz="2000" b="1" i="1" dirty="0">
+              <a:rPr lang="en-US" sz="3200" b="1" i="1" dirty="0">
                 <a:solidFill>
                   <a:schemeClr val="accent1"/>
                 </a:solidFill>
-                <a:latin typeface="Fira Sans"/>
+                <a:latin typeface="Fira Sans" panose="020B0503050000020004" pitchFamily="34" charset="0"/>
               </a:rPr>
               <a:t>2 Steps Ahead</a:t>
             </a:r>
-            <a:endParaRPr lang="en-US" dirty="0">
-              <a:solidFill>
-                <a:schemeClr val="accent1"/>
-              </a:solidFill>
-              <a:latin typeface="Fira Sans"/>
-            </a:endParaRPr>
           </a:p>
         </p:txBody>
       </p:sp>
@@ -16635,6 +16331,51 @@
               <a:t>1 Step Ahead</a:t>
             </a:r>
           </a:p>
+          <a:p>
+            <a:pPr algn="thaiDist">
+              <a:spcBef>
+                <a:spcPts val="0"/>
+              </a:spcBef>
+            </a:pPr>
+            <a:endParaRPr lang="en-US" sz="3600" dirty="0">
+              <a:solidFill>
+                <a:schemeClr val="accent1"/>
+              </a:solidFill>
+              <a:latin typeface="Fira Sans" panose="020B0503050000020004" pitchFamily="34" charset="0"/>
+            </a:endParaRPr>
+          </a:p>
+          <a:p>
+            <a:pPr algn="thaiDist">
+              <a:lnSpc>
+                <a:spcPct val="150000"/>
+              </a:lnSpc>
+              <a:spcBef>
+                <a:spcPts val="0"/>
+              </a:spcBef>
+            </a:pPr>
+            <a:r>
+              <a:rPr lang="en-US" sz="2000" dirty="0">
+                <a:latin typeface="Fira Sans" panose="020B0503050000020004" pitchFamily="34" charset="0"/>
+              </a:rPr>
+              <a:t>Models: ARMA(3,3), MA(1), and AR(1)</a:t>
+            </a:r>
+          </a:p>
+          <a:p>
+            <a:pPr algn="thaiDist">
+              <a:lnSpc>
+                <a:spcPct val="150000"/>
+              </a:lnSpc>
+              <a:spcBef>
+                <a:spcPts val="0"/>
+              </a:spcBef>
+            </a:pPr>
+            <a:r>
+              <a:rPr lang="en-US" sz="2000" dirty="0">
+                <a:latin typeface="Fira Sans" panose="020B0503050000020004" pitchFamily="34" charset="0"/>
+              </a:rPr>
+              <a:t>Scheme: Fixed for each</a:t>
+            </a:r>
+          </a:p>
         </p:txBody>
       </p:sp>
       <p:graphicFrame>
@@ -16652,14 +16393,14 @@
           <p:nvPr>
             <p:extLst>
               <p:ext uri="{D42A27DB-BD31-4B8C-83A1-F6EECF244321}">
-                <p14:modId xmlns:p14="http://schemas.microsoft.com/office/powerpoint/2010/main" val="1390420500"/>
+                <p14:modId xmlns:p14="http://schemas.microsoft.com/office/powerpoint/2010/main" val="3129439307"/>
               </p:ext>
             </p:extLst>
           </p:nvPr>
         </p:nvGraphicFramePr>
         <p:xfrm>
-          <a:off x="2281091" y="2565304"/>
-          <a:ext cx="7877683" cy="1828800"/>
+          <a:off x="2276901" y="3195924"/>
+          <a:ext cx="7877683" cy="1721472"/>
         </p:xfrm>
         <a:graphic>
           <a:graphicData uri="http://schemas.openxmlformats.org/drawingml/2006/table">
@@ -16705,7 +16446,7 @@
                         <a:defRPr/>
                       </a:pPr>
                       <a:r>
-                        <a:rPr lang="en-US" sz="2400" b="1" dirty="0">
+                        <a:rPr lang="en-US" sz="2200" b="1" dirty="0">
                           <a:solidFill>
                             <a:schemeClr val="bg1"/>
                           </a:solidFill>
@@ -16775,7 +16516,7 @@
                         </a:spcAft>
                       </a:pPr>
                       <a:r>
-                        <a:rPr lang="en-US" sz="2400" b="1" dirty="0">
+                        <a:rPr lang="en-US" sz="2200" b="1" dirty="0">
                           <a:solidFill>
                             <a:schemeClr val="bg1"/>
                           </a:solidFill>
@@ -16852,7 +16593,7 @@
                         </a:spcAft>
                       </a:pPr>
                       <a:r>
-                        <a:rPr lang="en-US" sz="2400" b="0" i="0" u="none" strike="noStrike" dirty="0">
+                        <a:rPr lang="en-US" sz="2200" b="0" i="0" u="none" strike="noStrike" dirty="0">
                           <a:solidFill>
                             <a:srgbClr val="000000"/>
                           </a:solidFill>
@@ -16915,7 +16656,7 @@
                     <a:p>
                       <a:pPr algn="r" fontAlgn="b"/>
                       <a:r>
-                        <a:rPr lang="en-US" sz="2400" b="0" i="0" u="none" strike="noStrike" dirty="0">
+                        <a:rPr lang="en-US" sz="2200" b="0" i="0" u="none" strike="noStrike" dirty="0">
                           <a:solidFill>
                             <a:srgbClr val="000000"/>
                           </a:solidFill>
@@ -16995,7 +16736,7 @@
                         </a:spcAft>
                       </a:pPr>
                       <a:r>
-                        <a:rPr lang="en-US" sz="2400" b="0" i="0" u="none" strike="noStrike" dirty="0">
+                        <a:rPr lang="en-US" sz="2200" b="0" i="0" u="none" strike="noStrike" dirty="0">
                           <a:solidFill>
                             <a:srgbClr val="000000"/>
                           </a:solidFill>
@@ -17058,7 +16799,7 @@
                     <a:p>
                       <a:pPr algn="r" fontAlgn="b"/>
                       <a:r>
-                        <a:rPr lang="en-US" sz="2400" b="0" i="0" u="none" strike="noStrike" dirty="0">
+                        <a:rPr lang="en-US" sz="2200" b="0" i="0" u="none" strike="noStrike" dirty="0">
                           <a:solidFill>
                             <a:srgbClr val="000000"/>
                           </a:solidFill>
@@ -17138,7 +16879,7 @@
                         </a:spcAft>
                       </a:pPr>
                       <a:r>
-                        <a:rPr lang="en-US" sz="2400" b="0" i="0" u="none" strike="noStrike" dirty="0">
+                        <a:rPr lang="en-US" sz="2200" b="0" i="0" u="none" strike="noStrike" dirty="0">
                           <a:solidFill>
                             <a:srgbClr val="000000"/>
                           </a:solidFill>
@@ -17201,7 +16942,7 @@
                     <a:p>
                       <a:pPr algn="r" fontAlgn="b"/>
                       <a:r>
-                        <a:rPr lang="en-US" sz="2400" b="0" i="0" u="none" strike="noStrike" dirty="0">
+                        <a:rPr lang="en-US" sz="2200" b="0" i="0" u="none" strike="noStrike" dirty="0">
                           <a:solidFill>
                             <a:srgbClr val="000000"/>
                           </a:solidFill>
@@ -17473,6 +17214,51 @@
               <a:t>2 Steps Ahead</a:t>
             </a:r>
           </a:p>
+          <a:p>
+            <a:pPr algn="thaiDist">
+              <a:spcBef>
+                <a:spcPts val="0"/>
+              </a:spcBef>
+            </a:pPr>
+            <a:endParaRPr lang="en-US" sz="3600" dirty="0">
+              <a:solidFill>
+                <a:schemeClr val="accent1"/>
+              </a:solidFill>
+              <a:latin typeface="Fira Sans" panose="020B0503050000020004" pitchFamily="34" charset="0"/>
+            </a:endParaRPr>
+          </a:p>
+          <a:p>
+            <a:pPr algn="thaiDist">
+              <a:lnSpc>
+                <a:spcPct val="150000"/>
+              </a:lnSpc>
+              <a:spcBef>
+                <a:spcPts val="0"/>
+              </a:spcBef>
+            </a:pPr>
+            <a:r>
+              <a:rPr lang="en-US" sz="2000" dirty="0">
+                <a:latin typeface="Fira Sans" panose="020B0503050000020004" pitchFamily="34" charset="0"/>
+              </a:rPr>
+              <a:t>Models: ARMA(3,3), MA(1), and AR(1)</a:t>
+            </a:r>
+          </a:p>
+          <a:p>
+            <a:pPr algn="thaiDist">
+              <a:lnSpc>
+                <a:spcPct val="150000"/>
+              </a:lnSpc>
+              <a:spcBef>
+                <a:spcPts val="0"/>
+              </a:spcBef>
+            </a:pPr>
+            <a:r>
+              <a:rPr lang="en-US" sz="2000" dirty="0">
+                <a:latin typeface="Fira Sans" panose="020B0503050000020004" pitchFamily="34" charset="0"/>
+              </a:rPr>
+              <a:t>Scheme: Fixed for each</a:t>
+            </a:r>
+          </a:p>
         </p:txBody>
       </p:sp>
       <p:graphicFrame>
@@ -17490,14 +17276,14 @@
           <p:nvPr>
             <p:extLst>
               <p:ext uri="{D42A27DB-BD31-4B8C-83A1-F6EECF244321}">
-                <p14:modId xmlns:p14="http://schemas.microsoft.com/office/powerpoint/2010/main" val="2312379750"/>
+                <p14:modId xmlns:p14="http://schemas.microsoft.com/office/powerpoint/2010/main" val="1546959181"/>
               </p:ext>
             </p:extLst>
           </p:nvPr>
         </p:nvGraphicFramePr>
         <p:xfrm>
-          <a:off x="2281091" y="2512752"/>
-          <a:ext cx="7877683" cy="1828800"/>
+          <a:off x="2276901" y="3195924"/>
+          <a:ext cx="7877683" cy="1721472"/>
         </p:xfrm>
         <a:graphic>
           <a:graphicData uri="http://schemas.openxmlformats.org/drawingml/2006/table">
@@ -17543,7 +17329,7 @@
                         <a:defRPr/>
                       </a:pPr>
                       <a:r>
-                        <a:rPr lang="en-US" sz="2400" b="1" dirty="0">
+                        <a:rPr lang="en-US" sz="2200" b="1" dirty="0">
                           <a:solidFill>
                             <a:schemeClr val="bg1"/>
                           </a:solidFill>
@@ -17613,7 +17399,7 @@
                         </a:spcAft>
                       </a:pPr>
                       <a:r>
-                        <a:rPr lang="en-US" sz="2400" b="1" dirty="0">
+                        <a:rPr lang="en-US" sz="2200" b="1" dirty="0">
                           <a:solidFill>
                             <a:schemeClr val="bg1"/>
                           </a:solidFill>
@@ -17690,7 +17476,7 @@
                         </a:spcAft>
                       </a:pPr>
                       <a:r>
-                        <a:rPr lang="en-US" sz="2400" b="0" i="0" u="none" strike="noStrike" dirty="0">
+                        <a:rPr lang="en-US" sz="2200" b="0" i="0" u="none" strike="noStrike" dirty="0">
                           <a:solidFill>
                             <a:srgbClr val="000000"/>
                           </a:solidFill>
@@ -17755,7 +17541,7 @@
                         <a:buNone/>
                       </a:pPr>
                       <a:r>
-                        <a:rPr lang="en-US" sz="2400" b="0" i="0" u="none" strike="noStrike" dirty="0">
+                        <a:rPr lang="en-US" sz="2200" b="0" i="0" u="none" strike="noStrike" dirty="0">
                           <a:solidFill>
                             <a:srgbClr val="000000"/>
                           </a:solidFill>
@@ -17764,7 +17550,7 @@
                         </a:rPr>
                         <a:t>	26.60</a:t>
                       </a:r>
-                      <a:endParaRPr lang="en-US" dirty="0"/>
+                      <a:endParaRPr lang="en-US" sz="2200" dirty="0"/>
                     </a:p>
                   </a:txBody>
                   <a:tcPr anchor="b">
@@ -17836,7 +17622,7 @@
                         </a:spcAft>
                       </a:pPr>
                       <a:r>
-                        <a:rPr lang="en-US" sz="2400" b="0" i="0" u="none" strike="noStrike" dirty="0">
+                        <a:rPr lang="en-US" sz="2200" b="0" i="0" u="none" strike="noStrike" dirty="0">
                           <a:solidFill>
                             <a:srgbClr val="000000"/>
                           </a:solidFill>
@@ -17901,7 +17687,7 @@
                         <a:buNone/>
                       </a:pPr>
                       <a:r>
-                        <a:rPr lang="en-US" sz="2400" b="0" i="0" u="none" strike="noStrike" dirty="0">
+                        <a:rPr lang="en-US" sz="2200" b="0" i="0" u="none" strike="noStrike" dirty="0">
                           <a:solidFill>
                             <a:srgbClr val="000000"/>
                           </a:solidFill>
@@ -17910,7 +17696,7 @@
                         </a:rPr>
                         <a:t>24.97</a:t>
                       </a:r>
-                      <a:endParaRPr lang="en-US" dirty="0"/>
+                      <a:endParaRPr lang="en-US" sz="2200" dirty="0"/>
                     </a:p>
                   </a:txBody>
                   <a:tcPr anchor="b">
@@ -17982,7 +17768,7 @@
                         </a:spcAft>
                       </a:pPr>
                       <a:r>
-                        <a:rPr lang="en-US" sz="2400" b="0" i="0" u="none" strike="noStrike" dirty="0">
+                        <a:rPr lang="en-US" sz="2200" b="0" i="0" u="none" strike="noStrike" dirty="0">
                           <a:solidFill>
                             <a:srgbClr val="000000"/>
                           </a:solidFill>
@@ -18047,7 +17833,7 @@
                         <a:buNone/>
                       </a:pPr>
                       <a:r>
-                        <a:rPr lang="en-US" sz="2400" b="0" i="0" u="none" strike="noStrike" dirty="0">
+                        <a:rPr lang="en-US" sz="2200" b="0" i="0" u="none" strike="noStrike" dirty="0">
                           <a:solidFill>
                             <a:srgbClr val="000000"/>
                           </a:solidFill>
@@ -18056,7 +17842,7 @@
                         </a:rPr>
                         <a:t>19.40</a:t>
                       </a:r>
-                      <a:endParaRPr lang="en-US" dirty="0"/>
+                      <a:endParaRPr lang="en-US" sz="2200" dirty="0"/>
                     </a:p>
                   </a:txBody>
                   <a:tcPr anchor="b">
@@ -18144,6 +17930,35 @@
           <a:chExt cx="0" cy="0"/>
         </a:xfrm>
       </p:grpSpPr>
+      <p:pic>
+        <p:nvPicPr>
+          <p:cNvPr id="9" name="Picture 8">
+            <a:extLst>
+              <a:ext uri="{FF2B5EF4-FFF2-40B4-BE49-F238E27FC236}">
+                <a16:creationId xmlns:a16="http://schemas.microsoft.com/office/drawing/2014/main" id="{4B1D6520-A6E5-4C14-918E-C65E70F276BD}"/>
+              </a:ext>
+            </a:extLst>
+          </p:cNvPr>
+          <p:cNvPicPr>
+            <a:picLocks noChangeAspect="1"/>
+          </p:cNvPicPr>
+          <p:nvPr/>
+        </p:nvPicPr>
+        <p:blipFill rotWithShape="1">
+          <a:blip r:embed="rId2"/>
+          <a:srcRect b="8503"/>
+          <a:stretch/>
+        </p:blipFill>
+        <p:spPr>
+          <a:xfrm>
+            <a:off x="2511919" y="1520556"/>
+            <a:ext cx="7301631" cy="4278041"/>
+          </a:xfrm>
+          <a:prstGeom prst="rect">
+            <a:avLst/>
+          </a:prstGeom>
+        </p:spPr>
+      </p:pic>
       <p:sp>
         <p:nvSpPr>
           <p:cNvPr id="6" name="Google Shape;72;p15">
@@ -18333,36 +18148,6 @@
           </a:p>
         </p:txBody>
       </p:sp>
-      <p:pic>
-        <p:nvPicPr>
-          <p:cNvPr id="9" name="Picture 8">
-            <a:extLst>
-              <a:ext uri="{FF2B5EF4-FFF2-40B4-BE49-F238E27FC236}">
-                <a16:creationId xmlns:a16="http://schemas.microsoft.com/office/drawing/2014/main" id="{4B1D6520-A6E5-4C14-918E-C65E70F276BD}"/>
-              </a:ext>
-            </a:extLst>
-          </p:cNvPr>
-          <p:cNvPicPr>
-            <a:picLocks noChangeAspect="1"/>
-          </p:cNvPicPr>
-          <p:nvPr/>
-        </p:nvPicPr>
-        <p:blipFill>
-          <a:blip r:embed="rId2"/>
-          <a:stretch>
-            <a:fillRect/>
-          </a:stretch>
-        </p:blipFill>
-        <p:spPr>
-          <a:xfrm>
-            <a:off x="2837995" y="1440261"/>
-            <a:ext cx="6516009" cy="4172532"/>
-          </a:xfrm>
-          <a:prstGeom prst="rect">
-            <a:avLst/>
-          </a:prstGeom>
-        </p:spPr>
-      </p:pic>
     </p:spTree>
     <p:extLst>
       <p:ext uri="{BB962C8B-B14F-4D97-AF65-F5344CB8AC3E}">

</xml_diff>